<commit_message>
Terminando a primeira aula
</commit_message>
<xml_diff>
--- a/src/AulasReact.pptx
+++ b/src/AulasReact.pptx
@@ -6,8 +6,18 @@
   </p:sldMasterIdLst>
   <p:sldIdLst>
     <p:sldId id="256" r:id="rId2"/>
-    <p:sldId id="257" r:id="rId3"/>
-    <p:sldId id="258" r:id="rId4"/>
+    <p:sldId id="261" r:id="rId3"/>
+    <p:sldId id="262" r:id="rId4"/>
+    <p:sldId id="263" r:id="rId5"/>
+    <p:sldId id="258" r:id="rId6"/>
+    <p:sldId id="257" r:id="rId7"/>
+    <p:sldId id="264" r:id="rId8"/>
+    <p:sldId id="265" r:id="rId9"/>
+    <p:sldId id="266" r:id="rId10"/>
+    <p:sldId id="267" r:id="rId11"/>
+    <p:sldId id="268" r:id="rId12"/>
+    <p:sldId id="259" r:id="rId13"/>
+    <p:sldId id="260" r:id="rId14"/>
   </p:sldIdLst>
   <p:sldSz cx="12192000" cy="6858000"/>
   <p:notesSz cx="6858000" cy="9144000"/>
@@ -106,6 +116,11 @@
       </a:defRPr>
     </a:lvl9pPr>
   </p:defaultTextStyle>
+  <p:extLst>
+    <p:ext uri="{EFAFB233-063F-42B5-8137-9DF3F51BA10A}">
+      <p15:sldGuideLst xmlns:p15="http://schemas.microsoft.com/office/powerpoint/2012/main"/>
+    </p:ext>
+  </p:extLst>
 </p:presentation>
 </file>
 
@@ -256,7 +271,7 @@
           <a:p>
             <a:fld id="{4D798FAC-3F87-4A38-AC8D-ED7734BBC1D3}" type="datetimeFigureOut">
               <a:rPr lang="pt-BR" smtClean="0"/>
-              <a:t>22/06/2022</a:t>
+              <a:t>23/06/2022</a:t>
             </a:fld>
             <a:endParaRPr lang="pt-BR"/>
           </a:p>
@@ -454,7 +469,7 @@
           <a:p>
             <a:fld id="{4D798FAC-3F87-4A38-AC8D-ED7734BBC1D3}" type="datetimeFigureOut">
               <a:rPr lang="pt-BR" smtClean="0"/>
-              <a:t>22/06/2022</a:t>
+              <a:t>23/06/2022</a:t>
             </a:fld>
             <a:endParaRPr lang="pt-BR"/>
           </a:p>
@@ -662,7 +677,7 @@
           <a:p>
             <a:fld id="{4D798FAC-3F87-4A38-AC8D-ED7734BBC1D3}" type="datetimeFigureOut">
               <a:rPr lang="pt-BR" smtClean="0"/>
-              <a:t>22/06/2022</a:t>
+              <a:t>23/06/2022</a:t>
             </a:fld>
             <a:endParaRPr lang="pt-BR"/>
           </a:p>
@@ -860,7 +875,7 @@
           <a:p>
             <a:fld id="{4D798FAC-3F87-4A38-AC8D-ED7734BBC1D3}" type="datetimeFigureOut">
               <a:rPr lang="pt-BR" smtClean="0"/>
-              <a:t>22/06/2022</a:t>
+              <a:t>23/06/2022</a:t>
             </a:fld>
             <a:endParaRPr lang="pt-BR"/>
           </a:p>
@@ -1135,7 +1150,7 @@
           <a:p>
             <a:fld id="{4D798FAC-3F87-4A38-AC8D-ED7734BBC1D3}" type="datetimeFigureOut">
               <a:rPr lang="pt-BR" smtClean="0"/>
-              <a:t>22/06/2022</a:t>
+              <a:t>23/06/2022</a:t>
             </a:fld>
             <a:endParaRPr lang="pt-BR"/>
           </a:p>
@@ -1400,7 +1415,7 @@
           <a:p>
             <a:fld id="{4D798FAC-3F87-4A38-AC8D-ED7734BBC1D3}" type="datetimeFigureOut">
               <a:rPr lang="pt-BR" smtClean="0"/>
-              <a:t>22/06/2022</a:t>
+              <a:t>23/06/2022</a:t>
             </a:fld>
             <a:endParaRPr lang="pt-BR"/>
           </a:p>
@@ -1812,7 +1827,7 @@
           <a:p>
             <a:fld id="{4D798FAC-3F87-4A38-AC8D-ED7734BBC1D3}" type="datetimeFigureOut">
               <a:rPr lang="pt-BR" smtClean="0"/>
-              <a:t>22/06/2022</a:t>
+              <a:t>23/06/2022</a:t>
             </a:fld>
             <a:endParaRPr lang="pt-BR"/>
           </a:p>
@@ -1953,7 +1968,7 @@
           <a:p>
             <a:fld id="{4D798FAC-3F87-4A38-AC8D-ED7734BBC1D3}" type="datetimeFigureOut">
               <a:rPr lang="pt-BR" smtClean="0"/>
-              <a:t>22/06/2022</a:t>
+              <a:t>23/06/2022</a:t>
             </a:fld>
             <a:endParaRPr lang="pt-BR"/>
           </a:p>
@@ -2066,7 +2081,7 @@
           <a:p>
             <a:fld id="{4D798FAC-3F87-4A38-AC8D-ED7734BBC1D3}" type="datetimeFigureOut">
               <a:rPr lang="pt-BR" smtClean="0"/>
-              <a:t>22/06/2022</a:t>
+              <a:t>23/06/2022</a:t>
             </a:fld>
             <a:endParaRPr lang="pt-BR"/>
           </a:p>
@@ -2377,7 +2392,7 @@
           <a:p>
             <a:fld id="{4D798FAC-3F87-4A38-AC8D-ED7734BBC1D3}" type="datetimeFigureOut">
               <a:rPr lang="pt-BR" smtClean="0"/>
-              <a:t>22/06/2022</a:t>
+              <a:t>23/06/2022</a:t>
             </a:fld>
             <a:endParaRPr lang="pt-BR"/>
           </a:p>
@@ -2665,7 +2680,7 @@
           <a:p>
             <a:fld id="{4D798FAC-3F87-4A38-AC8D-ED7734BBC1D3}" type="datetimeFigureOut">
               <a:rPr lang="pt-BR" smtClean="0"/>
-              <a:t>22/06/2022</a:t>
+              <a:t>23/06/2022</a:t>
             </a:fld>
             <a:endParaRPr lang="pt-BR"/>
           </a:p>
@@ -2906,7 +2921,7 @@
           <a:p>
             <a:fld id="{4D798FAC-3F87-4A38-AC8D-ED7734BBC1D3}" type="datetimeFigureOut">
               <a:rPr lang="pt-BR" smtClean="0"/>
-              <a:t>22/06/2022</a:t>
+              <a:t>23/06/2022</a:t>
             </a:fld>
             <a:endParaRPr lang="pt-BR"/>
           </a:p>
@@ -3323,6 +3338,42 @@
           <a:chExt cx="0" cy="0"/>
         </a:xfrm>
       </p:grpSpPr>
+      <p:pic>
+        <p:nvPicPr>
+          <p:cNvPr id="9" name="Imagem 8" descr="Uma imagem contendo Padrão do plano de fundo&#10;&#10;Descrição gerada automaticamente">
+            <a:extLst>
+              <a:ext uri="{FF2B5EF4-FFF2-40B4-BE49-F238E27FC236}">
+                <a16:creationId xmlns:a16="http://schemas.microsoft.com/office/drawing/2014/main" id="{F6886F7B-3725-2B4D-DFE0-368B77B7293B}"/>
+              </a:ext>
+            </a:extLst>
+          </p:cNvPr>
+          <p:cNvPicPr>
+            <a:picLocks noChangeAspect="1"/>
+          </p:cNvPicPr>
+          <p:nvPr/>
+        </p:nvPicPr>
+        <p:blipFill>
+          <a:blip r:embed="rId2">
+            <a:extLst>
+              <a:ext uri="{28A0092B-C50C-407E-A947-70E740481C1C}">
+                <a14:useLocalDpi xmlns:a14="http://schemas.microsoft.com/office/drawing/2010/main" val="0"/>
+              </a:ext>
+            </a:extLst>
+          </a:blip>
+          <a:stretch>
+            <a:fillRect/>
+          </a:stretch>
+        </p:blipFill>
+        <p:spPr>
+          <a:xfrm>
+            <a:off x="-1" y="0"/>
+            <a:ext cx="13087787" cy="6858000"/>
+          </a:xfrm>
+          <a:prstGeom prst="rect">
+            <a:avLst/>
+          </a:prstGeom>
+        </p:spPr>
+      </p:pic>
       <p:sp>
         <p:nvSpPr>
           <p:cNvPr id="2" name="Título 1">
@@ -3339,41 +3390,38 @@
             <p:ph type="ctrTitle"/>
           </p:nvPr>
         </p:nvSpPr>
-        <p:spPr/>
-        <p:txBody>
-          <a:bodyPr/>
-          <a:lstStyle/>
-          <a:p>
-            <a:r>
-              <a:rPr lang="pt-BR" dirty="0" err="1"/>
+        <p:spPr>
+          <a:xfrm>
+            <a:off x="6260123" y="529809"/>
+            <a:ext cx="3193365" cy="1035050"/>
+          </a:xfrm>
+        </p:spPr>
+        <p:txBody>
+          <a:bodyPr>
+            <a:normAutofit/>
+          </a:bodyPr>
+          <a:lstStyle/>
+          <a:p>
+            <a:r>
+              <a:rPr lang="pt-BR" b="1" dirty="0" err="1">
+                <a:solidFill>
+                  <a:schemeClr val="bg1"/>
+                </a:solidFill>
+                <a:latin typeface="Aharoni" panose="02010803020104030203" pitchFamily="2" charset="-79"/>
+                <a:cs typeface="Aharoni" panose="02010803020104030203" pitchFamily="2" charset="-79"/>
+              </a:rPr>
               <a:t>React</a:t>
             </a:r>
-            <a:endParaRPr lang="pt-BR" dirty="0"/>
-          </a:p>
-        </p:txBody>
-      </p:sp>
-      <p:sp>
-        <p:nvSpPr>
-          <p:cNvPr id="3" name="Subtítulo 2">
-            <a:extLst>
-              <a:ext uri="{FF2B5EF4-FFF2-40B4-BE49-F238E27FC236}">
-                <a16:creationId xmlns:a16="http://schemas.microsoft.com/office/drawing/2014/main" id="{57FDF0A6-0070-5D09-E15B-F8DCA6FC6142}"/>
-              </a:ext>
-            </a:extLst>
-          </p:cNvPr>
-          <p:cNvSpPr>
-            <a:spLocks noGrp="1"/>
-          </p:cNvSpPr>
-          <p:nvPr>
-            <p:ph type="subTitle" idx="1"/>
-          </p:nvPr>
-        </p:nvSpPr>
-        <p:spPr/>
-        <p:txBody>
-          <a:bodyPr/>
-          <a:lstStyle/>
-          <a:p>
-            <a:endParaRPr lang="pt-BR"/>
+            <a:r>
+              <a:rPr lang="pt-BR" b="1" dirty="0">
+                <a:solidFill>
+                  <a:schemeClr val="bg1"/>
+                </a:solidFill>
+                <a:latin typeface="Aharoni" panose="02010803020104030203" pitchFamily="2" charset="-79"/>
+                <a:cs typeface="Aharoni" panose="02010803020104030203" pitchFamily="2" charset="-79"/>
+              </a:rPr>
+              <a:t> JS</a:t>
+            </a:r>
           </a:p>
         </p:txBody>
       </p:sp>
@@ -3381,6 +3429,802 @@
     <p:extLst>
       <p:ext uri="{BB962C8B-B14F-4D97-AF65-F5344CB8AC3E}">
         <p14:creationId xmlns:p14="http://schemas.microsoft.com/office/powerpoint/2010/main" val="4230155199"/>
+      </p:ext>
+    </p:extLst>
+  </p:cSld>
+  <p:clrMapOvr>
+    <a:masterClrMapping/>
+  </p:clrMapOvr>
+</p:sld>
+</file>
+
+<file path=ppt/slides/slide10.xml><?xml version="1.0" encoding="utf-8"?>
+<p:sld xmlns:a="http://schemas.openxmlformats.org/drawingml/2006/main" xmlns:r="http://schemas.openxmlformats.org/officeDocument/2006/relationships" xmlns:p="http://schemas.openxmlformats.org/presentationml/2006/main">
+  <p:cSld>
+    <p:spTree>
+      <p:nvGrpSpPr>
+        <p:cNvPr id="1" name=""/>
+        <p:cNvGrpSpPr/>
+        <p:nvPr/>
+      </p:nvGrpSpPr>
+      <p:grpSpPr>
+        <a:xfrm>
+          <a:off x="0" y="0"/>
+          <a:ext cx="0" cy="0"/>
+          <a:chOff x="0" y="0"/>
+          <a:chExt cx="0" cy="0"/>
+        </a:xfrm>
+      </p:grpSpPr>
+      <p:sp>
+        <p:nvSpPr>
+          <p:cNvPr id="2" name="Título 1">
+            <a:extLst>
+              <a:ext uri="{FF2B5EF4-FFF2-40B4-BE49-F238E27FC236}">
+                <a16:creationId xmlns:a16="http://schemas.microsoft.com/office/drawing/2014/main" id="{A01883DC-68DB-E81F-CCAD-790663C0F82B}"/>
+              </a:ext>
+            </a:extLst>
+          </p:cNvPr>
+          <p:cNvSpPr>
+            <a:spLocks noGrp="1"/>
+          </p:cNvSpPr>
+          <p:nvPr>
+            <p:ph type="title"/>
+          </p:nvPr>
+        </p:nvSpPr>
+        <p:spPr/>
+        <p:txBody>
+          <a:bodyPr/>
+          <a:lstStyle/>
+          <a:p>
+            <a:r>
+              <a:rPr lang="pt-BR" b="1" dirty="0">
+                <a:solidFill>
+                  <a:srgbClr val="78D1E1"/>
+                </a:solidFill>
+                <a:effectLst/>
+                <a:latin typeface="Consolas" panose="020B0609020204030204" pitchFamily="49" charset="0"/>
+              </a:rPr>
+              <a:t>Primeira Aula - </a:t>
+            </a:r>
+            <a:r>
+              <a:rPr lang="pt-BR" b="1" dirty="0" err="1">
+                <a:solidFill>
+                  <a:srgbClr val="78D1E1"/>
+                </a:solidFill>
+                <a:effectLst/>
+                <a:latin typeface="Consolas" panose="020B0609020204030204" pitchFamily="49" charset="0"/>
+              </a:rPr>
+              <a:t>GraphQL</a:t>
+            </a:r>
+            <a:endParaRPr lang="pt-BR" dirty="0"/>
+          </a:p>
+        </p:txBody>
+      </p:sp>
+      <p:sp>
+        <p:nvSpPr>
+          <p:cNvPr id="3" name="Espaço Reservado para Conteúdo 2">
+            <a:extLst>
+              <a:ext uri="{FF2B5EF4-FFF2-40B4-BE49-F238E27FC236}">
+                <a16:creationId xmlns:a16="http://schemas.microsoft.com/office/drawing/2014/main" id="{B699F8FA-491B-8B33-2EFC-3E19B31CEB21}"/>
+              </a:ext>
+            </a:extLst>
+          </p:cNvPr>
+          <p:cNvSpPr>
+            <a:spLocks noGrp="1"/>
+          </p:cNvSpPr>
+          <p:nvPr>
+            <p:ph idx="1"/>
+          </p:nvPr>
+        </p:nvSpPr>
+        <p:spPr>
+          <a:xfrm>
+            <a:off x="838200" y="1825625"/>
+            <a:ext cx="10515600" cy="4283627"/>
+          </a:xfrm>
+        </p:spPr>
+        <p:txBody>
+          <a:bodyPr/>
+          <a:lstStyle/>
+          <a:p>
+            <a:r>
+              <a:rPr lang="pt-BR" b="0" dirty="0" err="1">
+                <a:effectLst/>
+                <a:latin typeface="Consolas" panose="020B0609020204030204" pitchFamily="49" charset="0"/>
+              </a:rPr>
+              <a:t>Overfating</a:t>
+            </a:r>
+            <a:r>
+              <a:rPr lang="pt-BR" b="0" dirty="0">
+                <a:effectLst/>
+                <a:latin typeface="Consolas" panose="020B0609020204030204" pitchFamily="49" charset="0"/>
+              </a:rPr>
+              <a:t> = </a:t>
+            </a:r>
+            <a:r>
+              <a:rPr lang="pt-BR" b="0" dirty="0" err="1">
+                <a:effectLst/>
+                <a:latin typeface="Consolas" panose="020B0609020204030204" pitchFamily="49" charset="0"/>
+              </a:rPr>
+              <a:t>back-end</a:t>
+            </a:r>
+            <a:r>
+              <a:rPr lang="pt-BR" b="0" dirty="0">
+                <a:effectLst/>
+                <a:latin typeface="Consolas" panose="020B0609020204030204" pitchFamily="49" charset="0"/>
+              </a:rPr>
+              <a:t> retorna mais coisas que o front precisa</a:t>
+            </a:r>
+          </a:p>
+          <a:p>
+            <a:r>
+              <a:rPr lang="pt-BR" b="0" dirty="0" err="1">
+                <a:effectLst/>
+                <a:latin typeface="Consolas" panose="020B0609020204030204" pitchFamily="49" charset="0"/>
+              </a:rPr>
+              <a:t>Underfating</a:t>
+            </a:r>
+            <a:r>
+              <a:rPr lang="pt-BR" b="0" dirty="0">
+                <a:effectLst/>
+                <a:latin typeface="Consolas" panose="020B0609020204030204" pitchFamily="49" charset="0"/>
+              </a:rPr>
+              <a:t> = o </a:t>
+            </a:r>
+            <a:r>
+              <a:rPr lang="pt-BR" b="0" dirty="0" err="1">
+                <a:effectLst/>
+                <a:latin typeface="Consolas" panose="020B0609020204030204" pitchFamily="49" charset="0"/>
+              </a:rPr>
+              <a:t>back</a:t>
+            </a:r>
+            <a:r>
+              <a:rPr lang="pt-BR" b="0" dirty="0">
+                <a:effectLst/>
+                <a:latin typeface="Consolas" panose="020B0609020204030204" pitchFamily="49" charset="0"/>
+              </a:rPr>
+              <a:t> não retorna todas as </a:t>
+            </a:r>
+            <a:r>
+              <a:rPr lang="pt-BR" b="0" dirty="0" err="1">
+                <a:effectLst/>
+                <a:latin typeface="Consolas" panose="020B0609020204030204" pitchFamily="49" charset="0"/>
+              </a:rPr>
+              <a:t>infromações</a:t>
+            </a:r>
+            <a:r>
+              <a:rPr lang="pt-BR" b="0" dirty="0">
+                <a:effectLst/>
+                <a:latin typeface="Consolas" panose="020B0609020204030204" pitchFamily="49" charset="0"/>
+              </a:rPr>
+              <a:t> que precisamos no front</a:t>
+            </a:r>
+          </a:p>
+          <a:p>
+            <a:pPr marL="0" indent="0">
+              <a:buNone/>
+            </a:pPr>
+            <a:br>
+              <a:rPr lang="pt-BR" b="0" dirty="0">
+                <a:effectLst/>
+                <a:latin typeface="Consolas" panose="020B0609020204030204" pitchFamily="49" charset="0"/>
+              </a:rPr>
+            </a:br>
+            <a:r>
+              <a:rPr lang="pt-BR" b="0" dirty="0">
+                <a:effectLst/>
+                <a:latin typeface="Consolas" panose="020B0609020204030204" pitchFamily="49" charset="0"/>
+              </a:rPr>
+              <a:t>    </a:t>
+            </a:r>
+            <a:r>
+              <a:rPr lang="pt-BR" b="0" dirty="0" err="1">
+                <a:effectLst/>
+                <a:latin typeface="Consolas" panose="020B0609020204030204" pitchFamily="49" charset="0"/>
+              </a:rPr>
+              <a:t>GraphQL</a:t>
+            </a:r>
+            <a:r>
+              <a:rPr lang="pt-BR" b="0" dirty="0">
+                <a:effectLst/>
+                <a:latin typeface="Consolas" panose="020B0609020204030204" pitchFamily="49" charset="0"/>
+              </a:rPr>
+              <a:t> é o front que passa para o </a:t>
+            </a:r>
+            <a:r>
+              <a:rPr lang="pt-BR" b="0" dirty="0" err="1">
+                <a:effectLst/>
+                <a:latin typeface="Consolas" panose="020B0609020204030204" pitchFamily="49" charset="0"/>
+              </a:rPr>
+              <a:t>back</a:t>
+            </a:r>
+            <a:r>
+              <a:rPr lang="pt-BR" b="0" dirty="0">
+                <a:effectLst/>
+                <a:latin typeface="Consolas" panose="020B0609020204030204" pitchFamily="49" charset="0"/>
+              </a:rPr>
+              <a:t> quais informações ele precisa, o </a:t>
+            </a:r>
+            <a:r>
+              <a:rPr lang="pt-BR" b="0" dirty="0" err="1">
+                <a:effectLst/>
+                <a:latin typeface="Consolas" panose="020B0609020204030204" pitchFamily="49" charset="0"/>
+              </a:rPr>
+              <a:t>back</a:t>
+            </a:r>
+            <a:r>
+              <a:rPr lang="pt-BR" b="0" dirty="0">
+                <a:effectLst/>
+                <a:latin typeface="Consolas" panose="020B0609020204030204" pitchFamily="49" charset="0"/>
+              </a:rPr>
+              <a:t> se adapta conforme os dados que o front precisa</a:t>
+            </a:r>
+          </a:p>
+          <a:p>
+            <a:endParaRPr lang="pt-BR" dirty="0"/>
+          </a:p>
+        </p:txBody>
+      </p:sp>
+    </p:spTree>
+    <p:extLst>
+      <p:ext uri="{BB962C8B-B14F-4D97-AF65-F5344CB8AC3E}">
+        <p14:creationId xmlns:p14="http://schemas.microsoft.com/office/powerpoint/2010/main" val="2609959196"/>
+      </p:ext>
+    </p:extLst>
+  </p:cSld>
+  <p:clrMapOvr>
+    <a:masterClrMapping/>
+  </p:clrMapOvr>
+</p:sld>
+</file>
+
+<file path=ppt/slides/slide11.xml><?xml version="1.0" encoding="utf-8"?>
+<p:sld xmlns:a="http://schemas.openxmlformats.org/drawingml/2006/main" xmlns:r="http://schemas.openxmlformats.org/officeDocument/2006/relationships" xmlns:p="http://schemas.openxmlformats.org/presentationml/2006/main">
+  <p:cSld>
+    <p:spTree>
+      <p:nvGrpSpPr>
+        <p:cNvPr id="1" name=""/>
+        <p:cNvGrpSpPr/>
+        <p:nvPr/>
+      </p:nvGrpSpPr>
+      <p:grpSpPr>
+        <a:xfrm>
+          <a:off x="0" y="0"/>
+          <a:ext cx="0" cy="0"/>
+          <a:chOff x="0" y="0"/>
+          <a:chExt cx="0" cy="0"/>
+        </a:xfrm>
+      </p:grpSpPr>
+      <p:sp>
+        <p:nvSpPr>
+          <p:cNvPr id="2" name="Título 1">
+            <a:extLst>
+              <a:ext uri="{FF2B5EF4-FFF2-40B4-BE49-F238E27FC236}">
+                <a16:creationId xmlns:a16="http://schemas.microsoft.com/office/drawing/2014/main" id="{A24E6F56-526B-18FD-868F-6A39EC323C04}"/>
+              </a:ext>
+            </a:extLst>
+          </p:cNvPr>
+          <p:cNvSpPr>
+            <a:spLocks noGrp="1"/>
+          </p:cNvSpPr>
+          <p:nvPr>
+            <p:ph type="title"/>
+          </p:nvPr>
+        </p:nvSpPr>
+        <p:spPr/>
+        <p:txBody>
+          <a:bodyPr/>
+          <a:lstStyle/>
+          <a:p>
+            <a:r>
+              <a:rPr lang="pt-BR" b="1" dirty="0">
+                <a:solidFill>
+                  <a:srgbClr val="78D1E1"/>
+                </a:solidFill>
+                <a:effectLst/>
+                <a:latin typeface="Consolas" panose="020B0609020204030204" pitchFamily="49" charset="0"/>
+              </a:rPr>
+              <a:t>Primeira Aula - </a:t>
+            </a:r>
+            <a:r>
+              <a:rPr lang="pt-BR" b="1" dirty="0" err="1">
+                <a:solidFill>
+                  <a:srgbClr val="78D1E1"/>
+                </a:solidFill>
+                <a:effectLst/>
+                <a:latin typeface="Consolas" panose="020B0609020204030204" pitchFamily="49" charset="0"/>
+              </a:rPr>
+              <a:t>GraphQL</a:t>
+            </a:r>
+            <a:endParaRPr lang="pt-BR" dirty="0"/>
+          </a:p>
+        </p:txBody>
+      </p:sp>
+      <p:sp>
+        <p:nvSpPr>
+          <p:cNvPr id="3" name="Espaço Reservado para Conteúdo 2">
+            <a:extLst>
+              <a:ext uri="{FF2B5EF4-FFF2-40B4-BE49-F238E27FC236}">
+                <a16:creationId xmlns:a16="http://schemas.microsoft.com/office/drawing/2014/main" id="{934974E4-819B-1703-ADE7-116276173DB7}"/>
+              </a:ext>
+            </a:extLst>
+          </p:cNvPr>
+          <p:cNvSpPr>
+            <a:spLocks noGrp="1"/>
+          </p:cNvSpPr>
+          <p:nvPr>
+            <p:ph idx="1"/>
+          </p:nvPr>
+        </p:nvSpPr>
+        <p:spPr/>
+        <p:txBody>
+          <a:bodyPr/>
+          <a:lstStyle/>
+          <a:p>
+            <a:r>
+              <a:rPr lang="nn-NO" b="0" dirty="0">
+                <a:effectLst/>
+                <a:latin typeface="Consolas" panose="020B0609020204030204" pitchFamily="49" charset="0"/>
+              </a:rPr>
+              <a:t>npm i @apollo/client graphql</a:t>
+            </a:r>
+          </a:p>
+          <a:p>
+            <a:endParaRPr lang="pt-BR" dirty="0"/>
+          </a:p>
+        </p:txBody>
+      </p:sp>
+    </p:spTree>
+    <p:extLst>
+      <p:ext uri="{BB962C8B-B14F-4D97-AF65-F5344CB8AC3E}">
+        <p14:creationId xmlns:p14="http://schemas.microsoft.com/office/powerpoint/2010/main" val="3612807547"/>
+      </p:ext>
+    </p:extLst>
+  </p:cSld>
+  <p:clrMapOvr>
+    <a:masterClrMapping/>
+  </p:clrMapOvr>
+</p:sld>
+</file>
+
+<file path=ppt/slides/slide12.xml><?xml version="1.0" encoding="utf-8"?>
+<p:sld xmlns:a="http://schemas.openxmlformats.org/drawingml/2006/main" xmlns:r="http://schemas.openxmlformats.org/officeDocument/2006/relationships" xmlns:p="http://schemas.openxmlformats.org/presentationml/2006/main">
+  <p:cSld>
+    <p:bg>
+      <p:bgPr>
+        <a:solidFill>
+          <a:schemeClr val="bg1"/>
+        </a:solidFill>
+        <a:effectLst/>
+      </p:bgPr>
+    </p:bg>
+    <p:spTree>
+      <p:nvGrpSpPr>
+        <p:cNvPr id="1" name=""/>
+        <p:cNvGrpSpPr/>
+        <p:nvPr/>
+      </p:nvGrpSpPr>
+      <p:grpSpPr>
+        <a:xfrm>
+          <a:off x="0" y="0"/>
+          <a:ext cx="0" cy="0"/>
+          <a:chOff x="0" y="0"/>
+          <a:chExt cx="0" cy="0"/>
+        </a:xfrm>
+      </p:grpSpPr>
+      <p:sp>
+        <p:nvSpPr>
+          <p:cNvPr id="10" name="Rectangle 9">
+            <a:extLst>
+              <a:ext uri="{FF2B5EF4-FFF2-40B4-BE49-F238E27FC236}">
+                <a16:creationId xmlns:a16="http://schemas.microsoft.com/office/drawing/2014/main" id="{42A4FC2C-047E-45A5-965D-8E1E3BF09BC6}"/>
+              </a:ext>
+              <a:ext uri="{C183D7F6-B498-43B3-948B-1728B52AA6E4}">
+                <adec:decorative xmlns:adec="http://schemas.microsoft.com/office/drawing/2017/decorative" val="1"/>
+              </a:ext>
+            </a:extLst>
+          </p:cNvPr>
+          <p:cNvSpPr>
+            <a:spLocks noGrp="1" noRot="1" noChangeAspect="1" noMove="1" noResize="1" noEditPoints="1" noAdjustHandles="1" noChangeArrowheads="1" noChangeShapeType="1" noTextEdit="1"/>
+          </p:cNvSpPr>
+          <p:nvPr>
+            <p:extLst>
+              <p:ext uri="{386F3935-93C4-4BCD-93E2-E3B085C9AB24}">
+                <p16:designElem xmlns:p16="http://schemas.microsoft.com/office/powerpoint/2015/main" val="1"/>
+              </p:ext>
+            </p:extLst>
+          </p:nvPr>
+        </p:nvSpPr>
+        <p:spPr bwMode="white">
+          <a:xfrm>
+            <a:off x="1524" y="0"/>
+            <a:ext cx="12188952" cy="6858000"/>
+          </a:xfrm>
+          <a:prstGeom prst="rect">
+            <a:avLst/>
+          </a:prstGeom>
+          <a:noFill/>
+          <a:ln>
+            <a:noFill/>
+          </a:ln>
+        </p:spPr>
+        <p:style>
+          <a:lnRef idx="2">
+            <a:schemeClr val="accent1">
+              <a:shade val="50000"/>
+            </a:schemeClr>
+          </a:lnRef>
+          <a:fillRef idx="1">
+            <a:schemeClr val="accent1"/>
+          </a:fillRef>
+          <a:effectRef idx="0">
+            <a:schemeClr val="accent1"/>
+          </a:effectRef>
+          <a:fontRef idx="minor">
+            <a:schemeClr val="lt1"/>
+          </a:fontRef>
+        </p:style>
+        <p:txBody>
+          <a:bodyPr rtlCol="0" anchor="ctr"/>
+          <a:lstStyle>
+            <a:defPPr>
+              <a:defRPr lang="en-US"/>
+            </a:defPPr>
+            <a:lvl1pPr marL="0" algn="l" defTabSz="914400" rtl="0" eaLnBrk="1" latinLnBrk="0" hangingPunct="1">
+              <a:defRPr sz="1800" kern="1200">
+                <a:solidFill>
+                  <a:schemeClr val="lt1"/>
+                </a:solidFill>
+                <a:latin typeface="+mn-lt"/>
+                <a:ea typeface="+mn-ea"/>
+                <a:cs typeface="+mn-cs"/>
+              </a:defRPr>
+            </a:lvl1pPr>
+            <a:lvl2pPr marL="457200" algn="l" defTabSz="914400" rtl="0" eaLnBrk="1" latinLnBrk="0" hangingPunct="1">
+              <a:defRPr sz="1800" kern="1200">
+                <a:solidFill>
+                  <a:schemeClr val="lt1"/>
+                </a:solidFill>
+                <a:latin typeface="+mn-lt"/>
+                <a:ea typeface="+mn-ea"/>
+                <a:cs typeface="+mn-cs"/>
+              </a:defRPr>
+            </a:lvl2pPr>
+            <a:lvl3pPr marL="914400" algn="l" defTabSz="914400" rtl="0" eaLnBrk="1" latinLnBrk="0" hangingPunct="1">
+              <a:defRPr sz="1800" kern="1200">
+                <a:solidFill>
+                  <a:schemeClr val="lt1"/>
+                </a:solidFill>
+                <a:latin typeface="+mn-lt"/>
+                <a:ea typeface="+mn-ea"/>
+                <a:cs typeface="+mn-cs"/>
+              </a:defRPr>
+            </a:lvl3pPr>
+            <a:lvl4pPr marL="1371600" algn="l" defTabSz="914400" rtl="0" eaLnBrk="1" latinLnBrk="0" hangingPunct="1">
+              <a:defRPr sz="1800" kern="1200">
+                <a:solidFill>
+                  <a:schemeClr val="lt1"/>
+                </a:solidFill>
+                <a:latin typeface="+mn-lt"/>
+                <a:ea typeface="+mn-ea"/>
+                <a:cs typeface="+mn-cs"/>
+              </a:defRPr>
+            </a:lvl4pPr>
+            <a:lvl5pPr marL="1828800" algn="l" defTabSz="914400" rtl="0" eaLnBrk="1" latinLnBrk="0" hangingPunct="1">
+              <a:defRPr sz="1800" kern="1200">
+                <a:solidFill>
+                  <a:schemeClr val="lt1"/>
+                </a:solidFill>
+                <a:latin typeface="+mn-lt"/>
+                <a:ea typeface="+mn-ea"/>
+                <a:cs typeface="+mn-cs"/>
+              </a:defRPr>
+            </a:lvl5pPr>
+            <a:lvl6pPr marL="2286000" algn="l" defTabSz="914400" rtl="0" eaLnBrk="1" latinLnBrk="0" hangingPunct="1">
+              <a:defRPr sz="1800" kern="1200">
+                <a:solidFill>
+                  <a:schemeClr val="lt1"/>
+                </a:solidFill>
+                <a:latin typeface="+mn-lt"/>
+                <a:ea typeface="+mn-ea"/>
+                <a:cs typeface="+mn-cs"/>
+              </a:defRPr>
+            </a:lvl6pPr>
+            <a:lvl7pPr marL="2743200" algn="l" defTabSz="914400" rtl="0" eaLnBrk="1" latinLnBrk="0" hangingPunct="1">
+              <a:defRPr sz="1800" kern="1200">
+                <a:solidFill>
+                  <a:schemeClr val="lt1"/>
+                </a:solidFill>
+                <a:latin typeface="+mn-lt"/>
+                <a:ea typeface="+mn-ea"/>
+                <a:cs typeface="+mn-cs"/>
+              </a:defRPr>
+            </a:lvl7pPr>
+            <a:lvl8pPr marL="3200400" algn="l" defTabSz="914400" rtl="0" eaLnBrk="1" latinLnBrk="0" hangingPunct="1">
+              <a:defRPr sz="1800" kern="1200">
+                <a:solidFill>
+                  <a:schemeClr val="lt1"/>
+                </a:solidFill>
+                <a:latin typeface="+mn-lt"/>
+                <a:ea typeface="+mn-ea"/>
+                <a:cs typeface="+mn-cs"/>
+              </a:defRPr>
+            </a:lvl8pPr>
+            <a:lvl9pPr marL="3657600" algn="l" defTabSz="914400" rtl="0" eaLnBrk="1" latinLnBrk="0" hangingPunct="1">
+              <a:defRPr sz="1800" kern="1200">
+                <a:solidFill>
+                  <a:schemeClr val="lt1"/>
+                </a:solidFill>
+                <a:latin typeface="+mn-lt"/>
+                <a:ea typeface="+mn-ea"/>
+                <a:cs typeface="+mn-cs"/>
+              </a:defRPr>
+            </a:lvl9pPr>
+          </a:lstStyle>
+          <a:p>
+            <a:pPr algn="ctr"/>
+            <a:endParaRPr lang="en-US"/>
+          </a:p>
+        </p:txBody>
+      </p:sp>
+      <p:pic>
+        <p:nvPicPr>
+          <p:cNvPr id="5" name="Espaço Reservado para Conteúdo 4" descr="Tela de computador com texto preto sobre fundo branco&#10;&#10;Descrição gerada automaticamente">
+            <a:extLst>
+              <a:ext uri="{FF2B5EF4-FFF2-40B4-BE49-F238E27FC236}">
+                <a16:creationId xmlns:a16="http://schemas.microsoft.com/office/drawing/2014/main" id="{7F3F9C99-9E67-165A-4884-6379107FA4BD}"/>
+              </a:ext>
+            </a:extLst>
+          </p:cNvPr>
+          <p:cNvPicPr>
+            <a:picLocks noGrp="1" noChangeAspect="1"/>
+          </p:cNvPicPr>
+          <p:nvPr>
+            <p:ph idx="1"/>
+          </p:nvPr>
+        </p:nvPicPr>
+        <p:blipFill rotWithShape="1">
+          <a:blip r:embed="rId2"/>
+          <a:srcRect b="19"/>
+          <a:stretch/>
+        </p:blipFill>
+        <p:spPr>
+          <a:xfrm>
+            <a:off x="20" y="1282"/>
+            <a:ext cx="12191980" cy="6856718"/>
+          </a:xfrm>
+          <a:prstGeom prst="rect">
+            <a:avLst/>
+          </a:prstGeom>
+        </p:spPr>
+      </p:pic>
+    </p:spTree>
+    <p:extLst>
+      <p:ext uri="{BB962C8B-B14F-4D97-AF65-F5344CB8AC3E}">
+        <p14:creationId xmlns:p14="http://schemas.microsoft.com/office/powerpoint/2010/main" val="1292793484"/>
+      </p:ext>
+    </p:extLst>
+  </p:cSld>
+  <p:clrMapOvr>
+    <a:masterClrMapping/>
+  </p:clrMapOvr>
+</p:sld>
+</file>
+
+<file path=ppt/slides/slide13.xml><?xml version="1.0" encoding="utf-8"?>
+<p:sld xmlns:a="http://schemas.openxmlformats.org/drawingml/2006/main" xmlns:r="http://schemas.openxmlformats.org/officeDocument/2006/relationships" xmlns:p="http://schemas.openxmlformats.org/presentationml/2006/main">
+  <p:cSld>
+    <p:bg>
+      <p:bgPr>
+        <a:solidFill>
+          <a:schemeClr val="bg1"/>
+        </a:solidFill>
+        <a:effectLst/>
+      </p:bgPr>
+    </p:bg>
+    <p:spTree>
+      <p:nvGrpSpPr>
+        <p:cNvPr id="1" name=""/>
+        <p:cNvGrpSpPr/>
+        <p:nvPr/>
+      </p:nvGrpSpPr>
+      <p:grpSpPr>
+        <a:xfrm>
+          <a:off x="0" y="0"/>
+          <a:ext cx="0" cy="0"/>
+          <a:chOff x="0" y="0"/>
+          <a:chExt cx="0" cy="0"/>
+        </a:xfrm>
+      </p:grpSpPr>
+      <p:sp>
+        <p:nvSpPr>
+          <p:cNvPr id="10" name="Rectangle 9">
+            <a:extLst>
+              <a:ext uri="{FF2B5EF4-FFF2-40B4-BE49-F238E27FC236}">
+                <a16:creationId xmlns:a16="http://schemas.microsoft.com/office/drawing/2014/main" id="{42A4FC2C-047E-45A5-965D-8E1E3BF09BC6}"/>
+              </a:ext>
+              <a:ext uri="{C183D7F6-B498-43B3-948B-1728B52AA6E4}">
+                <adec:decorative xmlns:adec="http://schemas.microsoft.com/office/drawing/2017/decorative" val="1"/>
+              </a:ext>
+            </a:extLst>
+          </p:cNvPr>
+          <p:cNvSpPr>
+            <a:spLocks noGrp="1" noRot="1" noChangeAspect="1" noMove="1" noResize="1" noEditPoints="1" noAdjustHandles="1" noChangeArrowheads="1" noChangeShapeType="1" noTextEdit="1"/>
+          </p:cNvSpPr>
+          <p:nvPr>
+            <p:extLst>
+              <p:ext uri="{386F3935-93C4-4BCD-93E2-E3B085C9AB24}">
+                <p16:designElem xmlns:p16="http://schemas.microsoft.com/office/powerpoint/2015/main" val="1"/>
+              </p:ext>
+            </p:extLst>
+          </p:nvPr>
+        </p:nvSpPr>
+        <p:spPr bwMode="white">
+          <a:xfrm>
+            <a:off x="1524" y="0"/>
+            <a:ext cx="12188952" cy="6858000"/>
+          </a:xfrm>
+          <a:prstGeom prst="rect">
+            <a:avLst/>
+          </a:prstGeom>
+          <a:noFill/>
+          <a:ln>
+            <a:noFill/>
+          </a:ln>
+        </p:spPr>
+        <p:style>
+          <a:lnRef idx="2">
+            <a:schemeClr val="accent1">
+              <a:shade val="50000"/>
+            </a:schemeClr>
+          </a:lnRef>
+          <a:fillRef idx="1">
+            <a:schemeClr val="accent1"/>
+          </a:fillRef>
+          <a:effectRef idx="0">
+            <a:schemeClr val="accent1"/>
+          </a:effectRef>
+          <a:fontRef idx="minor">
+            <a:schemeClr val="lt1"/>
+          </a:fontRef>
+        </p:style>
+        <p:txBody>
+          <a:bodyPr rtlCol="0" anchor="ctr"/>
+          <a:lstStyle>
+            <a:defPPr>
+              <a:defRPr lang="en-US"/>
+            </a:defPPr>
+            <a:lvl1pPr marL="0" algn="l" defTabSz="914400" rtl="0" eaLnBrk="1" latinLnBrk="0" hangingPunct="1">
+              <a:defRPr sz="1800" kern="1200">
+                <a:solidFill>
+                  <a:schemeClr val="lt1"/>
+                </a:solidFill>
+                <a:latin typeface="+mn-lt"/>
+                <a:ea typeface="+mn-ea"/>
+                <a:cs typeface="+mn-cs"/>
+              </a:defRPr>
+            </a:lvl1pPr>
+            <a:lvl2pPr marL="457200" algn="l" defTabSz="914400" rtl="0" eaLnBrk="1" latinLnBrk="0" hangingPunct="1">
+              <a:defRPr sz="1800" kern="1200">
+                <a:solidFill>
+                  <a:schemeClr val="lt1"/>
+                </a:solidFill>
+                <a:latin typeface="+mn-lt"/>
+                <a:ea typeface="+mn-ea"/>
+                <a:cs typeface="+mn-cs"/>
+              </a:defRPr>
+            </a:lvl2pPr>
+            <a:lvl3pPr marL="914400" algn="l" defTabSz="914400" rtl="0" eaLnBrk="1" latinLnBrk="0" hangingPunct="1">
+              <a:defRPr sz="1800" kern="1200">
+                <a:solidFill>
+                  <a:schemeClr val="lt1"/>
+                </a:solidFill>
+                <a:latin typeface="+mn-lt"/>
+                <a:ea typeface="+mn-ea"/>
+                <a:cs typeface="+mn-cs"/>
+              </a:defRPr>
+            </a:lvl3pPr>
+            <a:lvl4pPr marL="1371600" algn="l" defTabSz="914400" rtl="0" eaLnBrk="1" latinLnBrk="0" hangingPunct="1">
+              <a:defRPr sz="1800" kern="1200">
+                <a:solidFill>
+                  <a:schemeClr val="lt1"/>
+                </a:solidFill>
+                <a:latin typeface="+mn-lt"/>
+                <a:ea typeface="+mn-ea"/>
+                <a:cs typeface="+mn-cs"/>
+              </a:defRPr>
+            </a:lvl4pPr>
+            <a:lvl5pPr marL="1828800" algn="l" defTabSz="914400" rtl="0" eaLnBrk="1" latinLnBrk="0" hangingPunct="1">
+              <a:defRPr sz="1800" kern="1200">
+                <a:solidFill>
+                  <a:schemeClr val="lt1"/>
+                </a:solidFill>
+                <a:latin typeface="+mn-lt"/>
+                <a:ea typeface="+mn-ea"/>
+                <a:cs typeface="+mn-cs"/>
+              </a:defRPr>
+            </a:lvl5pPr>
+            <a:lvl6pPr marL="2286000" algn="l" defTabSz="914400" rtl="0" eaLnBrk="1" latinLnBrk="0" hangingPunct="1">
+              <a:defRPr sz="1800" kern="1200">
+                <a:solidFill>
+                  <a:schemeClr val="lt1"/>
+                </a:solidFill>
+                <a:latin typeface="+mn-lt"/>
+                <a:ea typeface="+mn-ea"/>
+                <a:cs typeface="+mn-cs"/>
+              </a:defRPr>
+            </a:lvl6pPr>
+            <a:lvl7pPr marL="2743200" algn="l" defTabSz="914400" rtl="0" eaLnBrk="1" latinLnBrk="0" hangingPunct="1">
+              <a:defRPr sz="1800" kern="1200">
+                <a:solidFill>
+                  <a:schemeClr val="lt1"/>
+                </a:solidFill>
+                <a:latin typeface="+mn-lt"/>
+                <a:ea typeface="+mn-ea"/>
+                <a:cs typeface="+mn-cs"/>
+              </a:defRPr>
+            </a:lvl7pPr>
+            <a:lvl8pPr marL="3200400" algn="l" defTabSz="914400" rtl="0" eaLnBrk="1" latinLnBrk="0" hangingPunct="1">
+              <a:defRPr sz="1800" kern="1200">
+                <a:solidFill>
+                  <a:schemeClr val="lt1"/>
+                </a:solidFill>
+                <a:latin typeface="+mn-lt"/>
+                <a:ea typeface="+mn-ea"/>
+                <a:cs typeface="+mn-cs"/>
+              </a:defRPr>
+            </a:lvl8pPr>
+            <a:lvl9pPr marL="3657600" algn="l" defTabSz="914400" rtl="0" eaLnBrk="1" latinLnBrk="0" hangingPunct="1">
+              <a:defRPr sz="1800" kern="1200">
+                <a:solidFill>
+                  <a:schemeClr val="lt1"/>
+                </a:solidFill>
+                <a:latin typeface="+mn-lt"/>
+                <a:ea typeface="+mn-ea"/>
+                <a:cs typeface="+mn-cs"/>
+              </a:defRPr>
+            </a:lvl9pPr>
+          </a:lstStyle>
+          <a:p>
+            <a:pPr algn="ctr"/>
+            <a:endParaRPr lang="en-US"/>
+          </a:p>
+        </p:txBody>
+      </p:sp>
+      <p:pic>
+        <p:nvPicPr>
+          <p:cNvPr id="5" name="Espaço Reservado para Conteúdo 4">
+            <a:extLst>
+              <a:ext uri="{FF2B5EF4-FFF2-40B4-BE49-F238E27FC236}">
+                <a16:creationId xmlns:a16="http://schemas.microsoft.com/office/drawing/2014/main" id="{D48E7012-BF8F-ADEE-11F1-64A2A0B1AF36}"/>
+              </a:ext>
+            </a:extLst>
+          </p:cNvPr>
+          <p:cNvPicPr>
+            <a:picLocks noGrp="1" noChangeAspect="1"/>
+          </p:cNvPicPr>
+          <p:nvPr>
+            <p:ph idx="1"/>
+          </p:nvPr>
+        </p:nvPicPr>
+        <p:blipFill rotWithShape="1">
+          <a:blip r:embed="rId2"/>
+          <a:srcRect b="19"/>
+          <a:stretch/>
+        </p:blipFill>
+        <p:spPr>
+          <a:xfrm>
+            <a:off x="20" y="1282"/>
+            <a:ext cx="12191980" cy="6856718"/>
+          </a:xfrm>
+          <a:prstGeom prst="rect">
+            <a:avLst/>
+          </a:prstGeom>
+        </p:spPr>
+      </p:pic>
+    </p:spTree>
+    <p:extLst>
+      <p:ext uri="{BB962C8B-B14F-4D97-AF65-F5344CB8AC3E}">
+        <p14:creationId xmlns:p14="http://schemas.microsoft.com/office/powerpoint/2010/main" val="3841183000"/>
       </p:ext>
     </p:extLst>
   </p:cSld>
@@ -3412,6 +4256,746 @@
           <p:cNvPr id="2" name="Título 1">
             <a:extLst>
               <a:ext uri="{FF2B5EF4-FFF2-40B4-BE49-F238E27FC236}">
+                <a16:creationId xmlns:a16="http://schemas.microsoft.com/office/drawing/2014/main" id="{11C1D114-2B5C-A56B-64A1-C28674104BC8}"/>
+              </a:ext>
+            </a:extLst>
+          </p:cNvPr>
+          <p:cNvSpPr>
+            <a:spLocks noGrp="1"/>
+          </p:cNvSpPr>
+          <p:nvPr>
+            <p:ph type="title"/>
+          </p:nvPr>
+        </p:nvSpPr>
+        <p:spPr/>
+        <p:txBody>
+          <a:bodyPr/>
+          <a:lstStyle/>
+          <a:p>
+            <a:r>
+              <a:rPr lang="pt-BR" b="1" dirty="0">
+                <a:solidFill>
+                  <a:srgbClr val="78D1E1"/>
+                </a:solidFill>
+                <a:effectLst/>
+                <a:latin typeface="Consolas" panose="020B0609020204030204" pitchFamily="49" charset="0"/>
+              </a:rPr>
+              <a:t>Primeira Aula - Ferramentas</a:t>
+            </a:r>
+            <a:endParaRPr lang="pt-BR" dirty="0"/>
+          </a:p>
+        </p:txBody>
+      </p:sp>
+      <p:sp>
+        <p:nvSpPr>
+          <p:cNvPr id="3" name="Espaço Reservado para Conteúdo 2">
+            <a:extLst>
+              <a:ext uri="{FF2B5EF4-FFF2-40B4-BE49-F238E27FC236}">
+                <a16:creationId xmlns:a16="http://schemas.microsoft.com/office/drawing/2014/main" id="{0BABB045-DEF4-399E-09A2-E7C6B70AF586}"/>
+              </a:ext>
+            </a:extLst>
+          </p:cNvPr>
+          <p:cNvSpPr>
+            <a:spLocks noGrp="1"/>
+          </p:cNvSpPr>
+          <p:nvPr>
+            <p:ph idx="1"/>
+          </p:nvPr>
+        </p:nvSpPr>
+        <p:spPr/>
+        <p:txBody>
+          <a:bodyPr/>
+          <a:lstStyle/>
+          <a:p>
+            <a:r>
+              <a:rPr lang="pt-BR" b="0" dirty="0" err="1">
+                <a:effectLst/>
+                <a:latin typeface="Consolas" panose="020B0609020204030204" pitchFamily="49" charset="0"/>
+              </a:rPr>
+              <a:t>npm</a:t>
+            </a:r>
+            <a:r>
+              <a:rPr lang="pt-BR" b="0" dirty="0">
+                <a:effectLst/>
+                <a:latin typeface="Consolas" panose="020B0609020204030204" pitchFamily="49" charset="0"/>
+              </a:rPr>
+              <a:t> </a:t>
+            </a:r>
+            <a:r>
+              <a:rPr lang="pt-BR" b="0" dirty="0" err="1">
+                <a:effectLst/>
+                <a:latin typeface="Consolas" panose="020B0609020204030204" pitchFamily="49" charset="0"/>
+              </a:rPr>
+              <a:t>create</a:t>
+            </a:r>
+            <a:r>
+              <a:rPr lang="pt-BR" b="0" dirty="0">
+                <a:effectLst/>
+                <a:latin typeface="Consolas" panose="020B0609020204030204" pitchFamily="49" charset="0"/>
+              </a:rPr>
+              <a:t> </a:t>
+            </a:r>
+            <a:r>
+              <a:rPr lang="pt-BR" b="0" dirty="0" err="1">
+                <a:effectLst/>
+                <a:latin typeface="Consolas" panose="020B0609020204030204" pitchFamily="49" charset="0"/>
+              </a:rPr>
+              <a:t>vite@latest</a:t>
+            </a:r>
+            <a:r>
+              <a:rPr lang="pt-BR" b="0" dirty="0">
+                <a:effectLst/>
+                <a:latin typeface="Consolas" panose="020B0609020204030204" pitchFamily="49" charset="0"/>
+              </a:rPr>
+              <a:t> </a:t>
+            </a:r>
+          </a:p>
+          <a:p>
+            <a:pPr marL="0" indent="0">
+              <a:buNone/>
+            </a:pPr>
+            <a:r>
+              <a:rPr lang="pt-BR" b="0" dirty="0">
+                <a:effectLst/>
+                <a:latin typeface="Consolas" panose="020B0609020204030204" pitchFamily="49" charset="0"/>
+              </a:rPr>
+              <a:t>	É uma ferramenta de construção que visa fornecer uma experiência de desenvolvimento mais rápida e enxuta para projetos web modernos, possui servidor. </a:t>
+            </a:r>
+          </a:p>
+          <a:p>
+            <a:endParaRPr lang="pt-BR" dirty="0"/>
+          </a:p>
+        </p:txBody>
+      </p:sp>
+    </p:spTree>
+    <p:extLst>
+      <p:ext uri="{BB962C8B-B14F-4D97-AF65-F5344CB8AC3E}">
+        <p14:creationId xmlns:p14="http://schemas.microsoft.com/office/powerpoint/2010/main" val="1982444760"/>
+      </p:ext>
+    </p:extLst>
+  </p:cSld>
+  <p:clrMapOvr>
+    <a:masterClrMapping/>
+  </p:clrMapOvr>
+</p:sld>
+</file>
+
+<file path=ppt/slides/slide3.xml><?xml version="1.0" encoding="utf-8"?>
+<p:sld xmlns:a="http://schemas.openxmlformats.org/drawingml/2006/main" xmlns:r="http://schemas.openxmlformats.org/officeDocument/2006/relationships" xmlns:p="http://schemas.openxmlformats.org/presentationml/2006/main">
+  <p:cSld>
+    <p:spTree>
+      <p:nvGrpSpPr>
+        <p:cNvPr id="1" name=""/>
+        <p:cNvGrpSpPr/>
+        <p:nvPr/>
+      </p:nvGrpSpPr>
+      <p:grpSpPr>
+        <a:xfrm>
+          <a:off x="0" y="0"/>
+          <a:ext cx="0" cy="0"/>
+          <a:chOff x="0" y="0"/>
+          <a:chExt cx="0" cy="0"/>
+        </a:xfrm>
+      </p:grpSpPr>
+      <p:sp>
+        <p:nvSpPr>
+          <p:cNvPr id="2" name="Título 1">
+            <a:extLst>
+              <a:ext uri="{FF2B5EF4-FFF2-40B4-BE49-F238E27FC236}">
+                <a16:creationId xmlns:a16="http://schemas.microsoft.com/office/drawing/2014/main" id="{165CF40B-4CCB-E981-B935-B8791EFBBE70}"/>
+              </a:ext>
+            </a:extLst>
+          </p:cNvPr>
+          <p:cNvSpPr>
+            <a:spLocks noGrp="1"/>
+          </p:cNvSpPr>
+          <p:nvPr>
+            <p:ph type="title"/>
+          </p:nvPr>
+        </p:nvSpPr>
+        <p:spPr/>
+        <p:txBody>
+          <a:bodyPr/>
+          <a:lstStyle/>
+          <a:p>
+            <a:r>
+              <a:rPr lang="pt-BR" b="1" dirty="0">
+                <a:solidFill>
+                  <a:srgbClr val="78D1E1"/>
+                </a:solidFill>
+                <a:effectLst/>
+                <a:latin typeface="Consolas" panose="020B0609020204030204" pitchFamily="49" charset="0"/>
+              </a:rPr>
+              <a:t>Primeira Aula - </a:t>
+            </a:r>
+            <a:r>
+              <a:rPr lang="pt-BR" b="1" dirty="0" err="1">
+                <a:solidFill>
+                  <a:srgbClr val="78D1E1"/>
+                </a:solidFill>
+                <a:effectLst/>
+                <a:latin typeface="Consolas" panose="020B0609020204030204" pitchFamily="49" charset="0"/>
+              </a:rPr>
+              <a:t>Dependecias</a:t>
+            </a:r>
+            <a:endParaRPr lang="pt-BR" dirty="0"/>
+          </a:p>
+        </p:txBody>
+      </p:sp>
+      <p:sp>
+        <p:nvSpPr>
+          <p:cNvPr id="3" name="Espaço Reservado para Conteúdo 2">
+            <a:extLst>
+              <a:ext uri="{FF2B5EF4-FFF2-40B4-BE49-F238E27FC236}">
+                <a16:creationId xmlns:a16="http://schemas.microsoft.com/office/drawing/2014/main" id="{EA39374E-FC23-B6FD-2469-1CD5CA114467}"/>
+              </a:ext>
+            </a:extLst>
+          </p:cNvPr>
+          <p:cNvSpPr>
+            <a:spLocks noGrp="1"/>
+          </p:cNvSpPr>
+          <p:nvPr>
+            <p:ph idx="1"/>
+          </p:nvPr>
+        </p:nvSpPr>
+        <p:spPr/>
+        <p:txBody>
+          <a:bodyPr/>
+          <a:lstStyle/>
+          <a:p>
+            <a:r>
+              <a:rPr lang="pt-BR" b="0" dirty="0" err="1">
+                <a:effectLst/>
+                <a:latin typeface="Consolas" panose="020B0609020204030204" pitchFamily="49" charset="0"/>
+              </a:rPr>
+              <a:t>npm</a:t>
+            </a:r>
+            <a:r>
+              <a:rPr lang="pt-BR" b="0" dirty="0">
+                <a:effectLst/>
+                <a:latin typeface="Consolas" panose="020B0609020204030204" pitchFamily="49" charset="0"/>
+              </a:rPr>
+              <a:t> </a:t>
+            </a:r>
+            <a:r>
+              <a:rPr lang="pt-BR" b="0" dirty="0" err="1">
+                <a:effectLst/>
+                <a:latin typeface="Consolas" panose="020B0609020204030204" pitchFamily="49" charset="0"/>
+              </a:rPr>
+              <a:t>install</a:t>
+            </a:r>
+            <a:r>
+              <a:rPr lang="pt-BR" b="0" dirty="0">
+                <a:effectLst/>
+                <a:latin typeface="Consolas" panose="020B0609020204030204" pitchFamily="49" charset="0"/>
+              </a:rPr>
+              <a:t>: instalar todas as </a:t>
+            </a:r>
+            <a:r>
+              <a:rPr lang="pt-BR" b="0" dirty="0" err="1">
+                <a:effectLst/>
+                <a:latin typeface="Consolas" panose="020B0609020204030204" pitchFamily="49" charset="0"/>
+              </a:rPr>
+              <a:t>dependencias</a:t>
+            </a:r>
+            <a:endParaRPr lang="pt-BR" b="0" dirty="0">
+              <a:effectLst/>
+              <a:latin typeface="Consolas" panose="020B0609020204030204" pitchFamily="49" charset="0"/>
+            </a:endParaRPr>
+          </a:p>
+          <a:p>
+            <a:r>
+              <a:rPr lang="pt-BR" b="0" dirty="0" err="1">
+                <a:effectLst/>
+                <a:latin typeface="Consolas" panose="020B0609020204030204" pitchFamily="49" charset="0"/>
+              </a:rPr>
+              <a:t>npm</a:t>
+            </a:r>
+            <a:r>
+              <a:rPr lang="pt-BR" b="0" dirty="0">
+                <a:effectLst/>
+                <a:latin typeface="Consolas" panose="020B0609020204030204" pitchFamily="49" charset="0"/>
+              </a:rPr>
+              <a:t> i </a:t>
+            </a:r>
+            <a:r>
+              <a:rPr lang="pt-BR" b="0" dirty="0" err="1">
+                <a:effectLst/>
+                <a:latin typeface="Consolas" panose="020B0609020204030204" pitchFamily="49" charset="0"/>
+              </a:rPr>
+              <a:t>tailwindcss</a:t>
+            </a:r>
+            <a:r>
+              <a:rPr lang="pt-BR" b="0" dirty="0">
+                <a:effectLst/>
+                <a:latin typeface="Consolas" panose="020B0609020204030204" pitchFamily="49" charset="0"/>
+              </a:rPr>
+              <a:t> </a:t>
+            </a:r>
+            <a:r>
+              <a:rPr lang="pt-BR" b="0" dirty="0" err="1">
+                <a:effectLst/>
+                <a:latin typeface="Consolas" panose="020B0609020204030204" pitchFamily="49" charset="0"/>
+              </a:rPr>
+              <a:t>postcss</a:t>
+            </a:r>
+            <a:r>
+              <a:rPr lang="pt-BR" b="0" dirty="0">
+                <a:effectLst/>
+                <a:latin typeface="Consolas" panose="020B0609020204030204" pitchFamily="49" charset="0"/>
+              </a:rPr>
+              <a:t> </a:t>
+            </a:r>
+            <a:r>
+              <a:rPr lang="pt-BR" b="0" dirty="0" err="1">
+                <a:effectLst/>
+                <a:latin typeface="Consolas" panose="020B0609020204030204" pitchFamily="49" charset="0"/>
+              </a:rPr>
+              <a:t>autoprefixer</a:t>
+            </a:r>
+            <a:r>
+              <a:rPr lang="pt-BR" b="0" dirty="0">
+                <a:effectLst/>
+                <a:latin typeface="Consolas" panose="020B0609020204030204" pitchFamily="49" charset="0"/>
+              </a:rPr>
+              <a:t> -D </a:t>
+            </a:r>
+          </a:p>
+          <a:p>
+            <a:r>
+              <a:rPr lang="pt-BR" b="0" dirty="0" err="1">
+                <a:effectLst/>
+                <a:latin typeface="Consolas" panose="020B0609020204030204" pitchFamily="49" charset="0"/>
+              </a:rPr>
+              <a:t>npm</a:t>
+            </a:r>
+            <a:r>
+              <a:rPr lang="pt-BR" b="0" dirty="0">
+                <a:effectLst/>
+                <a:latin typeface="Consolas" panose="020B0609020204030204" pitchFamily="49" charset="0"/>
+              </a:rPr>
+              <a:t> </a:t>
+            </a:r>
+            <a:r>
+              <a:rPr lang="pt-BR" b="0" dirty="0" err="1">
+                <a:effectLst/>
+                <a:latin typeface="Consolas" panose="020B0609020204030204" pitchFamily="49" charset="0"/>
+              </a:rPr>
+              <a:t>tailwindcss</a:t>
+            </a:r>
+            <a:r>
+              <a:rPr lang="pt-BR" b="0" dirty="0">
+                <a:effectLst/>
+                <a:latin typeface="Consolas" panose="020B0609020204030204" pitchFamily="49" charset="0"/>
+              </a:rPr>
+              <a:t> </a:t>
+            </a:r>
+            <a:r>
+              <a:rPr lang="pt-BR" b="0" dirty="0" err="1">
+                <a:effectLst/>
+                <a:latin typeface="Consolas" panose="020B0609020204030204" pitchFamily="49" charset="0"/>
+              </a:rPr>
+              <a:t>init</a:t>
+            </a:r>
+            <a:r>
+              <a:rPr lang="pt-BR" b="0" dirty="0">
+                <a:effectLst/>
+                <a:latin typeface="Consolas" panose="020B0609020204030204" pitchFamily="49" charset="0"/>
+              </a:rPr>
+              <a:t> -p</a:t>
+            </a:r>
+          </a:p>
+          <a:p>
+            <a:pPr marL="0" indent="0" algn="just">
+              <a:buNone/>
+            </a:pPr>
+            <a:br>
+              <a:rPr lang="pt-BR" b="0" dirty="0">
+                <a:effectLst/>
+                <a:latin typeface="Consolas" panose="020B0609020204030204" pitchFamily="49" charset="0"/>
+              </a:rPr>
+            </a:br>
+            <a:r>
+              <a:rPr lang="pt-BR" b="0" dirty="0">
+                <a:effectLst/>
+                <a:latin typeface="Consolas" panose="020B0609020204030204" pitchFamily="49" charset="0"/>
+              </a:rPr>
+              <a:t>	</a:t>
+            </a:r>
+            <a:r>
+              <a:rPr lang="pt-BR" b="0" dirty="0" err="1">
+                <a:effectLst/>
+                <a:latin typeface="Consolas" panose="020B0609020204030204" pitchFamily="49" charset="0"/>
+              </a:rPr>
+              <a:t>tailwind</a:t>
+            </a:r>
+            <a:r>
+              <a:rPr lang="pt-BR" b="0" dirty="0">
+                <a:effectLst/>
+                <a:latin typeface="Consolas" panose="020B0609020204030204" pitchFamily="49" charset="0"/>
+              </a:rPr>
+              <a:t>, permite fazer toda a estilização em classes, chamando de interface declarativa</a:t>
+            </a:r>
+          </a:p>
+          <a:p>
+            <a:endParaRPr lang="pt-BR" dirty="0"/>
+          </a:p>
+        </p:txBody>
+      </p:sp>
+    </p:spTree>
+    <p:extLst>
+      <p:ext uri="{BB962C8B-B14F-4D97-AF65-F5344CB8AC3E}">
+        <p14:creationId xmlns:p14="http://schemas.microsoft.com/office/powerpoint/2010/main" val="1380084534"/>
+      </p:ext>
+    </p:extLst>
+  </p:cSld>
+  <p:clrMapOvr>
+    <a:masterClrMapping/>
+  </p:clrMapOvr>
+</p:sld>
+</file>
+
+<file path=ppt/slides/slide4.xml><?xml version="1.0" encoding="utf-8"?>
+<p:sld xmlns:a="http://schemas.openxmlformats.org/drawingml/2006/main" xmlns:r="http://schemas.openxmlformats.org/officeDocument/2006/relationships" xmlns:p="http://schemas.openxmlformats.org/presentationml/2006/main">
+  <p:cSld>
+    <p:spTree>
+      <p:nvGrpSpPr>
+        <p:cNvPr id="1" name=""/>
+        <p:cNvGrpSpPr/>
+        <p:nvPr/>
+      </p:nvGrpSpPr>
+      <p:grpSpPr>
+        <a:xfrm>
+          <a:off x="0" y="0"/>
+          <a:ext cx="0" cy="0"/>
+          <a:chOff x="0" y="0"/>
+          <a:chExt cx="0" cy="0"/>
+        </a:xfrm>
+      </p:grpSpPr>
+      <p:sp>
+        <p:nvSpPr>
+          <p:cNvPr id="2" name="Título 1">
+            <a:extLst>
+              <a:ext uri="{FF2B5EF4-FFF2-40B4-BE49-F238E27FC236}">
+                <a16:creationId xmlns:a16="http://schemas.microsoft.com/office/drawing/2014/main" id="{A28D33BE-25C0-3843-03D1-69EC70407909}"/>
+              </a:ext>
+            </a:extLst>
+          </p:cNvPr>
+          <p:cNvSpPr>
+            <a:spLocks noGrp="1"/>
+          </p:cNvSpPr>
+          <p:nvPr>
+            <p:ph type="title"/>
+          </p:nvPr>
+        </p:nvSpPr>
+        <p:spPr/>
+        <p:txBody>
+          <a:bodyPr/>
+          <a:lstStyle/>
+          <a:p>
+            <a:r>
+              <a:rPr lang="pt-BR" b="1" dirty="0">
+                <a:solidFill>
+                  <a:srgbClr val="78D1E1"/>
+                </a:solidFill>
+                <a:effectLst/>
+                <a:latin typeface="Consolas" panose="020B0609020204030204" pitchFamily="49" charset="0"/>
+              </a:rPr>
+              <a:t>Primeira Aula - Extensões</a:t>
+            </a:r>
+            <a:endParaRPr lang="pt-BR" dirty="0"/>
+          </a:p>
+        </p:txBody>
+      </p:sp>
+      <p:sp>
+        <p:nvSpPr>
+          <p:cNvPr id="3" name="Espaço Reservado para Conteúdo 2">
+            <a:extLst>
+              <a:ext uri="{FF2B5EF4-FFF2-40B4-BE49-F238E27FC236}">
+                <a16:creationId xmlns:a16="http://schemas.microsoft.com/office/drawing/2014/main" id="{E524412C-93CE-0678-B67E-C1DB55C2DCC9}"/>
+              </a:ext>
+            </a:extLst>
+          </p:cNvPr>
+          <p:cNvSpPr>
+            <a:spLocks noGrp="1"/>
+          </p:cNvSpPr>
+          <p:nvPr>
+            <p:ph idx="1"/>
+          </p:nvPr>
+        </p:nvSpPr>
+        <p:spPr/>
+        <p:txBody>
+          <a:bodyPr/>
+          <a:lstStyle/>
+          <a:p>
+            <a:r>
+              <a:rPr lang="pt-BR" b="0" dirty="0">
+                <a:effectLst/>
+                <a:latin typeface="Consolas" panose="020B0609020204030204" pitchFamily="49" charset="0"/>
+              </a:rPr>
+              <a:t> baixar extensões do VS </a:t>
+            </a:r>
+            <a:r>
+              <a:rPr lang="pt-BR" b="0" dirty="0" err="1">
+                <a:effectLst/>
+                <a:latin typeface="Consolas" panose="020B0609020204030204" pitchFamily="49" charset="0"/>
+              </a:rPr>
+              <a:t>code</a:t>
+            </a:r>
+            <a:r>
+              <a:rPr lang="pt-BR" b="0" dirty="0">
+                <a:effectLst/>
+                <a:latin typeface="Consolas" panose="020B0609020204030204" pitchFamily="49" charset="0"/>
+              </a:rPr>
+              <a:t>:</a:t>
+            </a:r>
+          </a:p>
+          <a:p>
+            <a:r>
+              <a:rPr lang="pt-BR" b="0" dirty="0">
+                <a:effectLst/>
+                <a:latin typeface="Consolas" panose="020B0609020204030204" pitchFamily="49" charset="0"/>
+              </a:rPr>
+              <a:t> </a:t>
+            </a:r>
+            <a:r>
+              <a:rPr lang="pt-BR" b="0" dirty="0" err="1">
+                <a:effectLst/>
+                <a:latin typeface="Consolas" panose="020B0609020204030204" pitchFamily="49" charset="0"/>
+              </a:rPr>
+              <a:t>GraphQL</a:t>
+            </a:r>
+            <a:r>
+              <a:rPr lang="pt-BR" b="0" dirty="0">
+                <a:effectLst/>
+                <a:latin typeface="Consolas" panose="020B0609020204030204" pitchFamily="49" charset="0"/>
+              </a:rPr>
+              <a:t>, </a:t>
+            </a:r>
+            <a:r>
+              <a:rPr lang="pt-BR" b="0" dirty="0" err="1">
+                <a:effectLst/>
+                <a:latin typeface="Consolas" panose="020B0609020204030204" pitchFamily="49" charset="0"/>
+              </a:rPr>
+              <a:t>PostCSS</a:t>
+            </a:r>
+            <a:r>
+              <a:rPr lang="pt-BR" b="0" dirty="0">
+                <a:effectLst/>
+                <a:latin typeface="Consolas" panose="020B0609020204030204" pitchFamily="49" charset="0"/>
+              </a:rPr>
+              <a:t>, </a:t>
+            </a:r>
+            <a:r>
+              <a:rPr lang="pt-BR" b="0" dirty="0" err="1">
+                <a:effectLst/>
+                <a:latin typeface="Consolas" panose="020B0609020204030204" pitchFamily="49" charset="0"/>
+              </a:rPr>
+              <a:t>Tailwind</a:t>
+            </a:r>
+            <a:r>
+              <a:rPr lang="pt-BR" b="0" dirty="0">
+                <a:effectLst/>
+                <a:latin typeface="Consolas" panose="020B0609020204030204" pitchFamily="49" charset="0"/>
+              </a:rPr>
+              <a:t> CSS</a:t>
+            </a:r>
+          </a:p>
+          <a:p>
+            <a:pPr marL="0" indent="0">
+              <a:buNone/>
+            </a:pPr>
+            <a:br>
+              <a:rPr lang="pt-BR" b="0" dirty="0">
+                <a:solidFill>
+                  <a:srgbClr val="E1E1E6"/>
+                </a:solidFill>
+                <a:effectLst/>
+                <a:latin typeface="Consolas" panose="020B0609020204030204" pitchFamily="49" charset="0"/>
+              </a:rPr>
+            </a:br>
+            <a:endParaRPr lang="pt-BR" b="0" dirty="0">
+              <a:solidFill>
+                <a:srgbClr val="E1E1E6"/>
+              </a:solidFill>
+              <a:effectLst/>
+              <a:latin typeface="Consolas" panose="020B0609020204030204" pitchFamily="49" charset="0"/>
+            </a:endParaRPr>
+          </a:p>
+          <a:p>
+            <a:endParaRPr lang="pt-BR" dirty="0"/>
+          </a:p>
+        </p:txBody>
+      </p:sp>
+    </p:spTree>
+    <p:extLst>
+      <p:ext uri="{BB962C8B-B14F-4D97-AF65-F5344CB8AC3E}">
+        <p14:creationId xmlns:p14="http://schemas.microsoft.com/office/powerpoint/2010/main" val="1558838331"/>
+      </p:ext>
+    </p:extLst>
+  </p:cSld>
+  <p:clrMapOvr>
+    <a:masterClrMapping/>
+  </p:clrMapOvr>
+</p:sld>
+</file>
+
+<file path=ppt/slides/slide5.xml><?xml version="1.0" encoding="utf-8"?>
+<p:sld xmlns:a="http://schemas.openxmlformats.org/drawingml/2006/main" xmlns:r="http://schemas.openxmlformats.org/officeDocument/2006/relationships" xmlns:p="http://schemas.openxmlformats.org/presentationml/2006/main">
+  <p:cSld>
+    <p:spTree>
+      <p:nvGrpSpPr>
+        <p:cNvPr id="1" name=""/>
+        <p:cNvGrpSpPr/>
+        <p:nvPr/>
+      </p:nvGrpSpPr>
+      <p:grpSpPr>
+        <a:xfrm>
+          <a:off x="0" y="0"/>
+          <a:ext cx="0" cy="0"/>
+          <a:chOff x="0" y="0"/>
+          <a:chExt cx="0" cy="0"/>
+        </a:xfrm>
+      </p:grpSpPr>
+      <p:sp>
+        <p:nvSpPr>
+          <p:cNvPr id="2" name="Título 1">
+            <a:extLst>
+              <a:ext uri="{FF2B5EF4-FFF2-40B4-BE49-F238E27FC236}">
+                <a16:creationId xmlns:a16="http://schemas.microsoft.com/office/drawing/2014/main" id="{3B6035A5-6634-8450-6968-1ADE622B7C60}"/>
+              </a:ext>
+            </a:extLst>
+          </p:cNvPr>
+          <p:cNvSpPr>
+            <a:spLocks noGrp="1"/>
+          </p:cNvSpPr>
+          <p:nvPr>
+            <p:ph type="title"/>
+          </p:nvPr>
+        </p:nvSpPr>
+        <p:spPr/>
+        <p:txBody>
+          <a:bodyPr/>
+          <a:lstStyle/>
+          <a:p>
+            <a:r>
+              <a:rPr lang="pt-BR" b="1" dirty="0">
+                <a:solidFill>
+                  <a:srgbClr val="78D1E1"/>
+                </a:solidFill>
+                <a:effectLst/>
+                <a:latin typeface="Consolas" panose="020B0609020204030204" pitchFamily="49" charset="0"/>
+              </a:rPr>
+              <a:t>Primeira Aula – Aplicar CSS </a:t>
+            </a:r>
+            <a:r>
+              <a:rPr lang="pt-BR" b="1" dirty="0" err="1">
+                <a:solidFill>
+                  <a:srgbClr val="78D1E1"/>
+                </a:solidFill>
+                <a:effectLst/>
+                <a:latin typeface="Consolas" panose="020B0609020204030204" pitchFamily="49" charset="0"/>
+              </a:rPr>
+              <a:t>arquvio</a:t>
+            </a:r>
+            <a:endParaRPr lang="pt-BR" dirty="0"/>
+          </a:p>
+        </p:txBody>
+      </p:sp>
+      <p:pic>
+        <p:nvPicPr>
+          <p:cNvPr id="5" name="Espaço Reservado para Conteúdo 4">
+            <a:extLst>
+              <a:ext uri="{FF2B5EF4-FFF2-40B4-BE49-F238E27FC236}">
+                <a16:creationId xmlns:a16="http://schemas.microsoft.com/office/drawing/2014/main" id="{1947E3E9-9635-F121-A036-401F93116756}"/>
+              </a:ext>
+            </a:extLst>
+          </p:cNvPr>
+          <p:cNvPicPr>
+            <a:picLocks noGrp="1" noChangeAspect="1"/>
+          </p:cNvPicPr>
+          <p:nvPr>
+            <p:ph idx="1"/>
+          </p:nvPr>
+        </p:nvPicPr>
+        <p:blipFill>
+          <a:blip r:embed="rId2"/>
+          <a:stretch>
+            <a:fillRect/>
+          </a:stretch>
+        </p:blipFill>
+        <p:spPr>
+          <a:xfrm>
+            <a:off x="631807" y="2006074"/>
+            <a:ext cx="6201640" cy="1952898"/>
+          </a:xfrm>
+        </p:spPr>
+      </p:pic>
+      <p:pic>
+        <p:nvPicPr>
+          <p:cNvPr id="7" name="Imagem 6">
+            <a:extLst>
+              <a:ext uri="{FF2B5EF4-FFF2-40B4-BE49-F238E27FC236}">
+                <a16:creationId xmlns:a16="http://schemas.microsoft.com/office/drawing/2014/main" id="{8581DE56-DB27-F4AA-E174-5E945AA0995A}"/>
+              </a:ext>
+            </a:extLst>
+          </p:cNvPr>
+          <p:cNvPicPr>
+            <a:picLocks noChangeAspect="1"/>
+          </p:cNvPicPr>
+          <p:nvPr/>
+        </p:nvPicPr>
+        <p:blipFill>
+          <a:blip r:embed="rId3"/>
+          <a:stretch>
+            <a:fillRect/>
+          </a:stretch>
+        </p:blipFill>
+        <p:spPr>
+          <a:xfrm>
+            <a:off x="5224973" y="4091477"/>
+            <a:ext cx="5790030" cy="1971740"/>
+          </a:xfrm>
+          <a:prstGeom prst="rect">
+            <a:avLst/>
+          </a:prstGeom>
+        </p:spPr>
+      </p:pic>
+    </p:spTree>
+    <p:extLst>
+      <p:ext uri="{BB962C8B-B14F-4D97-AF65-F5344CB8AC3E}">
+        <p14:creationId xmlns:p14="http://schemas.microsoft.com/office/powerpoint/2010/main" val="1565245218"/>
+      </p:ext>
+    </p:extLst>
+  </p:cSld>
+  <p:clrMapOvr>
+    <a:masterClrMapping/>
+  </p:clrMapOvr>
+</p:sld>
+</file>
+
+<file path=ppt/slides/slide6.xml><?xml version="1.0" encoding="utf-8"?>
+<p:sld xmlns:a="http://schemas.openxmlformats.org/drawingml/2006/main" xmlns:r="http://schemas.openxmlformats.org/officeDocument/2006/relationships" xmlns:p="http://schemas.openxmlformats.org/presentationml/2006/main">
+  <p:cSld>
+    <p:spTree>
+      <p:nvGrpSpPr>
+        <p:cNvPr id="1" name=""/>
+        <p:cNvGrpSpPr/>
+        <p:nvPr/>
+      </p:nvGrpSpPr>
+      <p:grpSpPr>
+        <a:xfrm>
+          <a:off x="0" y="0"/>
+          <a:ext cx="0" cy="0"/>
+          <a:chOff x="0" y="0"/>
+          <a:chExt cx="0" cy="0"/>
+        </a:xfrm>
+      </p:grpSpPr>
+      <p:sp>
+        <p:nvSpPr>
+          <p:cNvPr id="2" name="Título 1">
+            <a:extLst>
+              <a:ext uri="{FF2B5EF4-FFF2-40B4-BE49-F238E27FC236}">
                 <a16:creationId xmlns:a16="http://schemas.microsoft.com/office/drawing/2014/main" id="{2DB3FD00-D126-A4FA-E78C-A783EEA45C53}"/>
               </a:ext>
             </a:extLst>
@@ -3429,12 +5013,14 @@
           <a:lstStyle/>
           <a:p>
             <a:r>
-              <a:rPr lang="pt-BR" dirty="0"/>
-              <a:t>Aplicar CSS – no </a:t>
-            </a:r>
-            <a:r>
-              <a:rPr lang="pt-BR" dirty="0" err="1"/>
-              <a:t>html</a:t>
+              <a:rPr lang="pt-BR" b="1" dirty="0">
+                <a:solidFill>
+                  <a:srgbClr val="78D1E1"/>
+                </a:solidFill>
+                <a:effectLst/>
+                <a:latin typeface="Consolas" panose="020B0609020204030204" pitchFamily="49" charset="0"/>
+              </a:rPr>
+              <a:t>Primeira Aula – Aplicar CSS no HTML</a:t>
             </a:r>
             <a:endParaRPr lang="pt-BR" dirty="0"/>
           </a:p>
@@ -3482,7 +5068,7 @@
 </p:sld>
 </file>
 
-<file path=ppt/slides/slide3.xml><?xml version="1.0" encoding="utf-8"?>
+<file path=ppt/slides/slide7.xml><?xml version="1.0" encoding="utf-8"?>
 <p:sld xmlns:a="http://schemas.openxmlformats.org/drawingml/2006/main" xmlns:r="http://schemas.openxmlformats.org/officeDocument/2006/relationships" xmlns:p="http://schemas.openxmlformats.org/presentationml/2006/main">
   <p:cSld>
     <p:spTree>
@@ -3504,7 +5090,7 @@
           <p:cNvPr id="2" name="Título 1">
             <a:extLst>
               <a:ext uri="{FF2B5EF4-FFF2-40B4-BE49-F238E27FC236}">
-                <a16:creationId xmlns:a16="http://schemas.microsoft.com/office/drawing/2014/main" id="{3B6035A5-6634-8450-6968-1ADE622B7C60}"/>
+                <a16:creationId xmlns:a16="http://schemas.microsoft.com/office/drawing/2014/main" id="{43EA1F88-6380-5A3D-0E64-CB7C5D49B8D2}"/>
               </a:ext>
             </a:extLst>
           </p:cNvPr>
@@ -3521,80 +5107,508 @@
           <a:lstStyle/>
           <a:p>
             <a:r>
-              <a:rPr lang="pt-BR" dirty="0"/>
-              <a:t>Aplicar CSS – arquivo </a:t>
-            </a:r>
-            <a:r>
-              <a:rPr lang="pt-BR" dirty="0" err="1"/>
-              <a:t>css</a:t>
+              <a:rPr lang="pt-BR" b="1" dirty="0">
+                <a:solidFill>
+                  <a:srgbClr val="78D1E1"/>
+                </a:solidFill>
+                <a:effectLst/>
+                <a:latin typeface="Consolas" panose="020B0609020204030204" pitchFamily="49" charset="0"/>
+              </a:rPr>
+              <a:t>Primeira Aula - CMS</a:t>
             </a:r>
             <a:endParaRPr lang="pt-BR" dirty="0"/>
           </a:p>
         </p:txBody>
       </p:sp>
-      <p:pic>
-        <p:nvPicPr>
-          <p:cNvPr id="5" name="Espaço Reservado para Conteúdo 4">
-            <a:extLst>
-              <a:ext uri="{FF2B5EF4-FFF2-40B4-BE49-F238E27FC236}">
-                <a16:creationId xmlns:a16="http://schemas.microsoft.com/office/drawing/2014/main" id="{1947E3E9-9635-F121-A036-401F93116756}"/>
-              </a:ext>
-            </a:extLst>
-          </p:cNvPr>
-          <p:cNvPicPr>
-            <a:picLocks noGrp="1" noChangeAspect="1"/>
-          </p:cNvPicPr>
+      <p:sp>
+        <p:nvSpPr>
+          <p:cNvPr id="3" name="Espaço Reservado para Conteúdo 2">
+            <a:extLst>
+              <a:ext uri="{FF2B5EF4-FFF2-40B4-BE49-F238E27FC236}">
+                <a16:creationId xmlns:a16="http://schemas.microsoft.com/office/drawing/2014/main" id="{433855CC-BC8F-879E-69A2-6A4EEDFD6EEF}"/>
+              </a:ext>
+            </a:extLst>
+          </p:cNvPr>
+          <p:cNvSpPr>
+            <a:spLocks noGrp="1"/>
+          </p:cNvSpPr>
           <p:nvPr>
             <p:ph idx="1"/>
           </p:nvPr>
-        </p:nvPicPr>
-        <p:blipFill>
-          <a:blip r:embed="rId2"/>
-          <a:stretch>
-            <a:fillRect/>
-          </a:stretch>
-        </p:blipFill>
-        <p:spPr>
-          <a:xfrm>
-            <a:off x="631807" y="2006074"/>
-            <a:ext cx="6201640" cy="1952898"/>
-          </a:xfrm>
-        </p:spPr>
-      </p:pic>
-      <p:pic>
-        <p:nvPicPr>
-          <p:cNvPr id="7" name="Imagem 6">
-            <a:extLst>
-              <a:ext uri="{FF2B5EF4-FFF2-40B4-BE49-F238E27FC236}">
-                <a16:creationId xmlns:a16="http://schemas.microsoft.com/office/drawing/2014/main" id="{8581DE56-DB27-F4AA-E174-5E945AA0995A}"/>
-              </a:ext>
-            </a:extLst>
-          </p:cNvPr>
-          <p:cNvPicPr>
-            <a:picLocks noChangeAspect="1"/>
-          </p:cNvPicPr>
-          <p:nvPr/>
-        </p:nvPicPr>
-        <p:blipFill>
-          <a:blip r:embed="rId3"/>
-          <a:stretch>
-            <a:fillRect/>
-          </a:stretch>
-        </p:blipFill>
-        <p:spPr>
-          <a:xfrm>
-            <a:off x="5224973" y="4091477"/>
-            <a:ext cx="5790030" cy="1971740"/>
-          </a:xfrm>
-          <a:prstGeom prst="rect">
-            <a:avLst/>
-          </a:prstGeom>
-        </p:spPr>
-      </p:pic>
+        </p:nvSpPr>
+        <p:spPr/>
+        <p:txBody>
+          <a:bodyPr>
+            <a:normAutofit fontScale="92500"/>
+          </a:bodyPr>
+          <a:lstStyle/>
+          <a:p>
+            <a:r>
+              <a:rPr lang="pt-BR" b="0" dirty="0">
+                <a:effectLst/>
+                <a:latin typeface="Consolas" panose="020B0609020204030204" pitchFamily="49" charset="0"/>
+              </a:rPr>
+              <a:t>CMS = </a:t>
+            </a:r>
+            <a:r>
+              <a:rPr lang="pt-BR" b="0" dirty="0" err="1">
+                <a:effectLst/>
+                <a:latin typeface="Consolas" panose="020B0609020204030204" pitchFamily="49" charset="0"/>
+              </a:rPr>
+              <a:t>Content</a:t>
+            </a:r>
+            <a:r>
+              <a:rPr lang="pt-BR" b="0" dirty="0">
+                <a:effectLst/>
+                <a:latin typeface="Consolas" panose="020B0609020204030204" pitchFamily="49" charset="0"/>
+              </a:rPr>
+              <a:t> Management System</a:t>
+            </a:r>
+          </a:p>
+          <a:p>
+            <a:pPr algn="just"/>
+            <a:r>
+              <a:rPr lang="pt-BR" b="0" dirty="0">
+                <a:effectLst/>
+                <a:latin typeface="Consolas" panose="020B0609020204030204" pitchFamily="49" charset="0"/>
+              </a:rPr>
+              <a:t>   É um software executado no navegador permite que você crie, gerencie e modifique um website e seu conteúdo sem a necessidade de conhecimento de programação.</a:t>
+            </a:r>
+          </a:p>
+          <a:p>
+            <a:pPr marL="0" indent="0" algn="just">
+              <a:buNone/>
+            </a:pPr>
+            <a:br>
+              <a:rPr lang="pt-BR" b="0" dirty="0">
+                <a:effectLst/>
+                <a:latin typeface="Consolas" panose="020B0609020204030204" pitchFamily="49" charset="0"/>
+              </a:rPr>
+            </a:br>
+            <a:r>
+              <a:rPr lang="pt-BR" b="0" dirty="0">
+                <a:effectLst/>
+                <a:latin typeface="Consolas" panose="020B0609020204030204" pitchFamily="49" charset="0"/>
+              </a:rPr>
+              <a:t>    Assim sendo, ele possui uma interface gráfica para ajudar no gerenciamento de todos os aspectos do seu site. Você pode criar e editar conteúdos, adicionar imagens e vídeos, e montar o layout do site. </a:t>
+            </a:r>
+            <a:r>
+              <a:rPr lang="pt-BR" b="0" dirty="0" err="1">
+                <a:effectLst/>
+                <a:latin typeface="Consolas" panose="020B0609020204030204" pitchFamily="49" charset="0"/>
+              </a:rPr>
+              <a:t>WordPress</a:t>
+            </a:r>
+            <a:r>
+              <a:rPr lang="pt-BR" b="0" dirty="0">
+                <a:effectLst/>
+                <a:latin typeface="Consolas" panose="020B0609020204030204" pitchFamily="49" charset="0"/>
+              </a:rPr>
+              <a:t>, </a:t>
+            </a:r>
+            <a:r>
+              <a:rPr lang="pt-BR" b="0" dirty="0" err="1">
+                <a:effectLst/>
+                <a:latin typeface="Consolas" panose="020B0609020204030204" pitchFamily="49" charset="0"/>
+              </a:rPr>
+              <a:t>Magento</a:t>
+            </a:r>
+            <a:r>
+              <a:rPr lang="pt-BR" b="0" dirty="0">
+                <a:effectLst/>
+                <a:latin typeface="Consolas" panose="020B0609020204030204" pitchFamily="49" charset="0"/>
+              </a:rPr>
+              <a:t>, e </a:t>
+            </a:r>
+            <a:r>
+              <a:rPr lang="pt-BR" b="0" dirty="0" err="1">
+                <a:effectLst/>
+                <a:latin typeface="Consolas" panose="020B0609020204030204" pitchFamily="49" charset="0"/>
+              </a:rPr>
+              <a:t>Drupal</a:t>
+            </a:r>
+            <a:r>
+              <a:rPr lang="pt-BR" b="0" dirty="0">
+                <a:effectLst/>
+                <a:latin typeface="Consolas" panose="020B0609020204030204" pitchFamily="49" charset="0"/>
+              </a:rPr>
+              <a:t> são alguns dos CMS mais populares do mercado.</a:t>
+            </a:r>
+          </a:p>
+          <a:p>
+            <a:endParaRPr lang="pt-BR" dirty="0"/>
+          </a:p>
+        </p:txBody>
+      </p:sp>
     </p:spTree>
     <p:extLst>
       <p:ext uri="{BB962C8B-B14F-4D97-AF65-F5344CB8AC3E}">
-        <p14:creationId xmlns:p14="http://schemas.microsoft.com/office/powerpoint/2010/main" val="1565245218"/>
+        <p14:creationId xmlns:p14="http://schemas.microsoft.com/office/powerpoint/2010/main" val="46020609"/>
+      </p:ext>
+    </p:extLst>
+  </p:cSld>
+  <p:clrMapOvr>
+    <a:masterClrMapping/>
+  </p:clrMapOvr>
+</p:sld>
+</file>
+
+<file path=ppt/slides/slide8.xml><?xml version="1.0" encoding="utf-8"?>
+<p:sld xmlns:a="http://schemas.openxmlformats.org/drawingml/2006/main" xmlns:r="http://schemas.openxmlformats.org/officeDocument/2006/relationships" xmlns:p="http://schemas.openxmlformats.org/presentationml/2006/main">
+  <p:cSld>
+    <p:spTree>
+      <p:nvGrpSpPr>
+        <p:cNvPr id="1" name=""/>
+        <p:cNvGrpSpPr/>
+        <p:nvPr/>
+      </p:nvGrpSpPr>
+      <p:grpSpPr>
+        <a:xfrm>
+          <a:off x="0" y="0"/>
+          <a:ext cx="0" cy="0"/>
+          <a:chOff x="0" y="0"/>
+          <a:chExt cx="0" cy="0"/>
+        </a:xfrm>
+      </p:grpSpPr>
+      <p:sp>
+        <p:nvSpPr>
+          <p:cNvPr id="2" name="Título 1">
+            <a:extLst>
+              <a:ext uri="{FF2B5EF4-FFF2-40B4-BE49-F238E27FC236}">
+                <a16:creationId xmlns:a16="http://schemas.microsoft.com/office/drawing/2014/main" id="{7E3C4FE2-5D84-867C-7AF8-EDAF6B0E2FA4}"/>
+              </a:ext>
+            </a:extLst>
+          </p:cNvPr>
+          <p:cNvSpPr>
+            <a:spLocks noGrp="1"/>
+          </p:cNvSpPr>
+          <p:nvPr>
+            <p:ph type="title"/>
+          </p:nvPr>
+        </p:nvSpPr>
+        <p:spPr/>
+        <p:txBody>
+          <a:bodyPr/>
+          <a:lstStyle/>
+          <a:p>
+            <a:r>
+              <a:rPr lang="pt-BR" b="1" dirty="0">
+                <a:solidFill>
+                  <a:srgbClr val="78D1E1"/>
+                </a:solidFill>
+                <a:effectLst/>
+                <a:latin typeface="Consolas" panose="020B0609020204030204" pitchFamily="49" charset="0"/>
+              </a:rPr>
+              <a:t>Primeira Aula - CMS</a:t>
+            </a:r>
+            <a:endParaRPr lang="pt-BR" dirty="0"/>
+          </a:p>
+        </p:txBody>
+      </p:sp>
+      <p:sp>
+        <p:nvSpPr>
+          <p:cNvPr id="3" name="Espaço Reservado para Conteúdo 2">
+            <a:extLst>
+              <a:ext uri="{FF2B5EF4-FFF2-40B4-BE49-F238E27FC236}">
+                <a16:creationId xmlns:a16="http://schemas.microsoft.com/office/drawing/2014/main" id="{02F8A83D-D14D-FC5E-688F-7041ECB18A0C}"/>
+              </a:ext>
+            </a:extLst>
+          </p:cNvPr>
+          <p:cNvSpPr>
+            <a:spLocks noGrp="1"/>
+          </p:cNvSpPr>
+          <p:nvPr>
+            <p:ph idx="1"/>
+          </p:nvPr>
+        </p:nvSpPr>
+        <p:spPr/>
+        <p:txBody>
+          <a:bodyPr/>
+          <a:lstStyle/>
+          <a:p>
+            <a:r>
+              <a:rPr lang="pt-BR" b="0" dirty="0">
+                <a:effectLst/>
+                <a:latin typeface="Consolas" panose="020B0609020204030204" pitchFamily="49" charset="0"/>
+              </a:rPr>
+              <a:t>Traz tanto o painel de ADMIN tanto quanto a parte visual do front-</a:t>
+            </a:r>
+            <a:r>
+              <a:rPr lang="pt-BR" b="0" dirty="0" err="1">
+                <a:effectLst/>
+                <a:latin typeface="Consolas" panose="020B0609020204030204" pitchFamily="49" charset="0"/>
+              </a:rPr>
+              <a:t>end</a:t>
+            </a:r>
+            <a:r>
+              <a:rPr lang="pt-BR" b="0" dirty="0">
+                <a:effectLst/>
+                <a:latin typeface="Consolas" panose="020B0609020204030204" pitchFamily="49" charset="0"/>
+              </a:rPr>
+              <a:t> (temas)</a:t>
+            </a:r>
+          </a:p>
+          <a:p>
+            <a:r>
+              <a:rPr lang="pt-BR" b="0" dirty="0" err="1">
+                <a:effectLst/>
+                <a:latin typeface="Consolas" panose="020B0609020204030204" pitchFamily="49" charset="0"/>
+              </a:rPr>
+              <a:t>Headless</a:t>
+            </a:r>
+            <a:r>
+              <a:rPr lang="pt-BR" b="0" dirty="0">
+                <a:effectLst/>
+                <a:latin typeface="Consolas" panose="020B0609020204030204" pitchFamily="49" charset="0"/>
+              </a:rPr>
+              <a:t> CMS (</a:t>
+            </a:r>
+            <a:r>
+              <a:rPr lang="pt-BR" b="0" dirty="0" err="1">
+                <a:effectLst/>
+                <a:latin typeface="Consolas" panose="020B0609020204030204" pitchFamily="49" charset="0"/>
+              </a:rPr>
+              <a:t>GRaphCMS</a:t>
+            </a:r>
+            <a:r>
+              <a:rPr lang="pt-BR" b="0" dirty="0">
+                <a:effectLst/>
+                <a:latin typeface="Consolas" panose="020B0609020204030204" pitchFamily="49" charset="0"/>
+              </a:rPr>
+              <a:t>): Painel de ADMIN (dados fornecidos através de uma API REST ou </a:t>
+            </a:r>
+            <a:r>
+              <a:rPr lang="pt-BR" b="0" dirty="0" err="1">
+                <a:effectLst/>
+                <a:latin typeface="Consolas" panose="020B0609020204030204" pitchFamily="49" charset="0"/>
+              </a:rPr>
+              <a:t>GraphQL</a:t>
+            </a:r>
+            <a:r>
+              <a:rPr lang="pt-BR" b="0" dirty="0">
+                <a:effectLst/>
+                <a:latin typeface="Consolas" panose="020B0609020204030204" pitchFamily="49" charset="0"/>
+              </a:rPr>
+              <a:t>)</a:t>
+            </a:r>
+          </a:p>
+          <a:p>
+            <a:r>
+              <a:rPr lang="pt-BR" b="0" dirty="0" err="1">
+                <a:effectLst/>
+                <a:latin typeface="Consolas" panose="020B0609020204030204" pitchFamily="49" charset="0"/>
+              </a:rPr>
+              <a:t>React</a:t>
+            </a:r>
+            <a:r>
+              <a:rPr lang="pt-BR" b="0" dirty="0">
+                <a:effectLst/>
+                <a:latin typeface="Consolas" panose="020B0609020204030204" pitchFamily="49" charset="0"/>
+              </a:rPr>
+              <a:t> que consome essa API do CMS</a:t>
+            </a:r>
+          </a:p>
+          <a:p>
+            <a:r>
+              <a:rPr lang="pt-BR" b="0">
+                <a:effectLst/>
+                <a:latin typeface="Consolas" panose="020B0609020204030204" pitchFamily="49" charset="0"/>
+              </a:rPr>
+              <a:t>Assim </a:t>
+            </a:r>
+            <a:r>
+              <a:rPr lang="pt-BR" b="0" dirty="0">
+                <a:effectLst/>
+                <a:latin typeface="Consolas" panose="020B0609020204030204" pitchFamily="49" charset="0"/>
+              </a:rPr>
+              <a:t>a nossa aplicação vai fazer chamadas à API, buscando informações e exibindo para o </a:t>
+            </a:r>
+            <a:r>
+              <a:rPr lang="pt-BR" b="0" dirty="0" err="1">
+                <a:effectLst/>
+                <a:latin typeface="Consolas" panose="020B0609020204030204" pitchFamily="49" charset="0"/>
+              </a:rPr>
+              <a:t>usuario</a:t>
+            </a:r>
+            <a:endParaRPr lang="pt-BR" b="0" dirty="0">
+              <a:effectLst/>
+              <a:latin typeface="Consolas" panose="020B0609020204030204" pitchFamily="49" charset="0"/>
+            </a:endParaRPr>
+          </a:p>
+          <a:p>
+            <a:endParaRPr lang="pt-BR" dirty="0"/>
+          </a:p>
+        </p:txBody>
+      </p:sp>
+    </p:spTree>
+    <p:extLst>
+      <p:ext uri="{BB962C8B-B14F-4D97-AF65-F5344CB8AC3E}">
+        <p14:creationId xmlns:p14="http://schemas.microsoft.com/office/powerpoint/2010/main" val="4228340002"/>
+      </p:ext>
+    </p:extLst>
+  </p:cSld>
+  <p:clrMapOvr>
+    <a:masterClrMapping/>
+  </p:clrMapOvr>
+</p:sld>
+</file>
+
+<file path=ppt/slides/slide9.xml><?xml version="1.0" encoding="utf-8"?>
+<p:sld xmlns:a="http://schemas.openxmlformats.org/drawingml/2006/main" xmlns:r="http://schemas.openxmlformats.org/officeDocument/2006/relationships" xmlns:p="http://schemas.openxmlformats.org/presentationml/2006/main">
+  <p:cSld>
+    <p:spTree>
+      <p:nvGrpSpPr>
+        <p:cNvPr id="1" name=""/>
+        <p:cNvGrpSpPr/>
+        <p:nvPr/>
+      </p:nvGrpSpPr>
+      <p:grpSpPr>
+        <a:xfrm>
+          <a:off x="0" y="0"/>
+          <a:ext cx="0" cy="0"/>
+          <a:chOff x="0" y="0"/>
+          <a:chExt cx="0" cy="0"/>
+        </a:xfrm>
+      </p:grpSpPr>
+      <p:sp>
+        <p:nvSpPr>
+          <p:cNvPr id="2" name="Título 1">
+            <a:extLst>
+              <a:ext uri="{FF2B5EF4-FFF2-40B4-BE49-F238E27FC236}">
+                <a16:creationId xmlns:a16="http://schemas.microsoft.com/office/drawing/2014/main" id="{37386DE8-3BFF-D859-39C9-60E3F9C06FA6}"/>
+              </a:ext>
+            </a:extLst>
+          </p:cNvPr>
+          <p:cNvSpPr>
+            <a:spLocks noGrp="1"/>
+          </p:cNvSpPr>
+          <p:nvPr>
+            <p:ph type="title"/>
+          </p:nvPr>
+        </p:nvSpPr>
+        <p:spPr/>
+        <p:txBody>
+          <a:bodyPr/>
+          <a:lstStyle/>
+          <a:p>
+            <a:r>
+              <a:rPr lang="pt-BR" b="1" dirty="0">
+                <a:solidFill>
+                  <a:srgbClr val="78D1E1"/>
+                </a:solidFill>
+                <a:effectLst/>
+                <a:latin typeface="Consolas" panose="020B0609020204030204" pitchFamily="49" charset="0"/>
+              </a:rPr>
+              <a:t>Primeira Aula - </a:t>
+            </a:r>
+            <a:r>
+              <a:rPr lang="pt-BR" b="1" dirty="0" err="1">
+                <a:solidFill>
+                  <a:srgbClr val="78D1E1"/>
+                </a:solidFill>
+                <a:effectLst/>
+                <a:latin typeface="Consolas" panose="020B0609020204030204" pitchFamily="49" charset="0"/>
+              </a:rPr>
+              <a:t>GraphQL</a:t>
+            </a:r>
+            <a:endParaRPr lang="pt-BR" dirty="0"/>
+          </a:p>
+        </p:txBody>
+      </p:sp>
+      <p:sp>
+        <p:nvSpPr>
+          <p:cNvPr id="3" name="Espaço Reservado para Conteúdo 2">
+            <a:extLst>
+              <a:ext uri="{FF2B5EF4-FFF2-40B4-BE49-F238E27FC236}">
+                <a16:creationId xmlns:a16="http://schemas.microsoft.com/office/drawing/2014/main" id="{DEB761DB-D23E-775A-602A-6DD0E28D0C87}"/>
+              </a:ext>
+            </a:extLst>
+          </p:cNvPr>
+          <p:cNvSpPr>
+            <a:spLocks noGrp="1"/>
+          </p:cNvSpPr>
+          <p:nvPr>
+            <p:ph idx="1"/>
+          </p:nvPr>
+        </p:nvSpPr>
+        <p:spPr/>
+        <p:txBody>
+          <a:bodyPr/>
+          <a:lstStyle/>
+          <a:p>
+            <a:r>
+              <a:rPr lang="pt-BR" dirty="0" err="1"/>
+              <a:t>GraphQL</a:t>
+            </a:r>
+            <a:r>
+              <a:rPr lang="pt-BR" dirty="0"/>
+              <a:t> é uma linguagem de consulta e ambiente de execução voltada a servidores para as interfaces de programação de aplicações (APIs)</a:t>
+            </a:r>
+          </a:p>
+          <a:p>
+            <a:endParaRPr lang="pt-BR" dirty="0"/>
+          </a:p>
+          <a:p>
+            <a:r>
+              <a:rPr lang="pt-BR" b="0" dirty="0">
+                <a:effectLst/>
+                <a:latin typeface="Consolas" panose="020B0609020204030204" pitchFamily="49" charset="0"/>
+              </a:rPr>
+              <a:t>Query / </a:t>
+            </a:r>
+            <a:r>
+              <a:rPr lang="pt-BR" b="0" dirty="0" err="1">
+                <a:effectLst/>
+                <a:latin typeface="Consolas" panose="020B0609020204030204" pitchFamily="49" charset="0"/>
+              </a:rPr>
+              <a:t>mutation</a:t>
+            </a:r>
+            <a:endParaRPr lang="pt-BR" b="0" dirty="0">
+              <a:effectLst/>
+              <a:latin typeface="Consolas" panose="020B0609020204030204" pitchFamily="49" charset="0"/>
+            </a:endParaRPr>
+          </a:p>
+          <a:p>
+            <a:r>
+              <a:rPr lang="pt-BR" b="0" dirty="0" err="1">
+                <a:effectLst/>
+                <a:latin typeface="Consolas" panose="020B0609020204030204" pitchFamily="49" charset="0"/>
+              </a:rPr>
+              <a:t>querry</a:t>
+            </a:r>
+            <a:r>
+              <a:rPr lang="pt-BR" b="0" dirty="0">
+                <a:effectLst/>
+                <a:latin typeface="Consolas" panose="020B0609020204030204" pitchFamily="49" charset="0"/>
+              </a:rPr>
+              <a:t> = buscar dados</a:t>
+            </a:r>
+          </a:p>
+          <a:p>
+            <a:r>
+              <a:rPr lang="pt-BR" b="0" dirty="0" err="1">
+                <a:effectLst/>
+                <a:latin typeface="Consolas" panose="020B0609020204030204" pitchFamily="49" charset="0"/>
+              </a:rPr>
+              <a:t>mutation</a:t>
+            </a:r>
+            <a:r>
+              <a:rPr lang="pt-BR" b="0" dirty="0">
+                <a:effectLst/>
+                <a:latin typeface="Consolas" panose="020B0609020204030204" pitchFamily="49" charset="0"/>
+              </a:rPr>
+              <a:t> = criar, alterar, deletar dados</a:t>
+            </a:r>
+          </a:p>
+          <a:p>
+            <a:endParaRPr lang="pt-BR" dirty="0"/>
+          </a:p>
+        </p:txBody>
+      </p:sp>
+    </p:spTree>
+    <p:extLst>
+      <p:ext uri="{BB962C8B-B14F-4D97-AF65-F5344CB8AC3E}">
+        <p14:creationId xmlns:p14="http://schemas.microsoft.com/office/powerpoint/2010/main" val="1518461243"/>
       </p:ext>
     </p:extLst>
   </p:cSld>

</xml_diff>